<commit_message>
The version I presented.
</commit_message>
<xml_diff>
--- a/legacy_code/israel17_handling_legacy_code.pptx
+++ b/legacy_code/israel17_handling_legacy_code.pptx
@@ -5,26 +5,25 @@
     <p:sldMasterId id="2147483696" r:id="rId1"/>
   </p:sldMasterIdLst>
   <p:notesMasterIdLst>
-    <p:notesMasterId r:id="rId19"/>
+    <p:notesMasterId r:id="rId18"/>
   </p:notesMasterIdLst>
   <p:sldIdLst>
     <p:sldId id="256" r:id="rId2"/>
     <p:sldId id="332" r:id="rId3"/>
     <p:sldId id="333" r:id="rId4"/>
-    <p:sldId id="325" r:id="rId5"/>
-    <p:sldId id="258" r:id="rId6"/>
-    <p:sldId id="323" r:id="rId7"/>
-    <p:sldId id="336" r:id="rId8"/>
-    <p:sldId id="335" r:id="rId9"/>
-    <p:sldId id="334" r:id="rId10"/>
-    <p:sldId id="327" r:id="rId11"/>
-    <p:sldId id="328" r:id="rId12"/>
-    <p:sldId id="326" r:id="rId13"/>
-    <p:sldId id="329" r:id="rId14"/>
-    <p:sldId id="330" r:id="rId15"/>
-    <p:sldId id="331" r:id="rId16"/>
-    <p:sldId id="322" r:id="rId17"/>
-    <p:sldId id="257" r:id="rId18"/>
+    <p:sldId id="323" r:id="rId5"/>
+    <p:sldId id="336" r:id="rId6"/>
+    <p:sldId id="335" r:id="rId7"/>
+    <p:sldId id="334" r:id="rId8"/>
+    <p:sldId id="327" r:id="rId9"/>
+    <p:sldId id="328" r:id="rId10"/>
+    <p:sldId id="326" r:id="rId11"/>
+    <p:sldId id="337" r:id="rId12"/>
+    <p:sldId id="329" r:id="rId13"/>
+    <p:sldId id="330" r:id="rId14"/>
+    <p:sldId id="331" r:id="rId15"/>
+    <p:sldId id="322" r:id="rId16"/>
+    <p:sldId id="257" r:id="rId17"/>
   </p:sldIdLst>
   <p:sldSz cx="9144000" cy="6858000" type="screen4x3"/>
   <p:notesSz cx="6858000" cy="9144000"/>
@@ -3269,7 +3268,7 @@
           <a:p>
             <a:fld id="{8D950561-BE6E-4B69-9925-6CD6424D68B9}" type="slidenum">
               <a:rPr lang="en-US" smtClean="0"/>
-              <a:t>7</a:t>
+              <a:t>5</a:t>
             </a:fld>
             <a:endParaRPr lang="en-US"/>
           </a:p>
@@ -8719,6 +8718,46 @@
           </a:p>
         </p:txBody>
       </p:sp>
+      <p:sp>
+        <p:nvSpPr>
+          <p:cNvPr id="4" name="TextBox 3">
+            <a:extLst>
+              <a:ext uri="{FF2B5EF4-FFF2-40B4-BE49-F238E27FC236}">
+                <a16:creationId xmlns:a16="http://schemas.microsoft.com/office/drawing/2014/main" id="{DEE5F52C-9CEE-4644-AB4A-674EF6273C0E}"/>
+              </a:ext>
+            </a:extLst>
+          </p:cNvPr>
+          <p:cNvSpPr txBox="1"/>
+          <p:nvPr/>
+        </p:nvSpPr>
+        <p:spPr>
+          <a:xfrm>
+            <a:off x="237392" y="6374423"/>
+            <a:ext cx="1675459" cy="369332"/>
+          </a:xfrm>
+          <a:prstGeom prst="rect">
+            <a:avLst/>
+          </a:prstGeom>
+          <a:noFill/>
+        </p:spPr>
+        <p:txBody>
+          <a:bodyPr wrap="none" rtlCol="0">
+            <a:spAutoFit/>
+          </a:bodyPr>
+          <a:lstStyle/>
+          <a:p>
+            <a:r>
+              <a:rPr lang="en-US" dirty="0"/>
+              <a:t>@</a:t>
+            </a:r>
+            <a:r>
+              <a:rPr lang="en-US" dirty="0" err="1"/>
+              <a:t>ArloBelshee</a:t>
+            </a:r>
+            <a:endParaRPr lang="en-US" dirty="0"/>
+          </a:p>
+        </p:txBody>
+      </p:sp>
     </p:spTree>
     <p:extLst>
       <p:ext uri="{BB962C8B-B14F-4D97-AF65-F5344CB8AC3E}">
@@ -8754,6 +8793,1421 @@
           <p:cNvPr id="2" name="Title 1">
             <a:extLst>
               <a:ext uri="{FF2B5EF4-FFF2-40B4-BE49-F238E27FC236}">
+                <a16:creationId xmlns:a16="http://schemas.microsoft.com/office/drawing/2014/main" id="{D3449C7C-F3E6-46A6-AC94-65CC460D1625}"/>
+              </a:ext>
+            </a:extLst>
+          </p:cNvPr>
+          <p:cNvSpPr>
+            <a:spLocks noGrp="1"/>
+          </p:cNvSpPr>
+          <p:nvPr>
+            <p:ph type="title"/>
+          </p:nvPr>
+        </p:nvSpPr>
+        <p:spPr/>
+        <p:txBody>
+          <a:bodyPr/>
+          <a:lstStyle/>
+          <a:p>
+            <a:r>
+              <a:rPr lang="en-US" dirty="0"/>
+              <a:t>Read by Refactoring</a:t>
+            </a:r>
+          </a:p>
+        </p:txBody>
+      </p:sp>
+    </p:spTree>
+    <p:extLst>
+      <p:ext uri="{BB962C8B-B14F-4D97-AF65-F5344CB8AC3E}">
+        <p14:creationId xmlns:p14="http://schemas.microsoft.com/office/powerpoint/2010/main" val="3559773507"/>
+      </p:ext>
+    </p:extLst>
+  </p:cSld>
+  <p:clrMapOvr>
+    <a:masterClrMapping/>
+  </p:clrMapOvr>
+</p:sld>
+</file>
+
+<file path=ppt/slides/slide11.xml><?xml version="1.0" encoding="utf-8"?>
+<p:sld xmlns:a="http://schemas.openxmlformats.org/drawingml/2006/main" xmlns:r="http://schemas.openxmlformats.org/officeDocument/2006/relationships" xmlns:p="http://schemas.openxmlformats.org/presentationml/2006/main">
+  <p:cSld>
+    <p:spTree>
+      <p:nvGrpSpPr>
+        <p:cNvPr id="1" name=""/>
+        <p:cNvGrpSpPr/>
+        <p:nvPr/>
+      </p:nvGrpSpPr>
+      <p:grpSpPr>
+        <a:xfrm>
+          <a:off x="0" y="0"/>
+          <a:ext cx="0" cy="0"/>
+          <a:chOff x="0" y="0"/>
+          <a:chExt cx="0" cy="0"/>
+        </a:xfrm>
+      </p:grpSpPr>
+      <p:sp>
+        <p:nvSpPr>
+          <p:cNvPr id="3" name="Title 2">
+            <a:extLst>
+              <a:ext uri="{FF2B5EF4-FFF2-40B4-BE49-F238E27FC236}">
+                <a16:creationId xmlns:a16="http://schemas.microsoft.com/office/drawing/2014/main" id="{5F6EF8C7-6D19-4711-AB5B-92123B9A2AEC}"/>
+              </a:ext>
+            </a:extLst>
+          </p:cNvPr>
+          <p:cNvSpPr>
+            <a:spLocks noGrp="1"/>
+          </p:cNvSpPr>
+          <p:nvPr>
+            <p:ph type="title"/>
+          </p:nvPr>
+        </p:nvSpPr>
+        <p:spPr/>
+        <p:txBody>
+          <a:bodyPr/>
+          <a:lstStyle/>
+          <a:p>
+            <a:r>
+              <a:rPr lang="en-US" dirty="0"/>
+              <a:t>Dependency Elimination</a:t>
+            </a:r>
+          </a:p>
+        </p:txBody>
+      </p:sp>
+      <p:sp>
+        <p:nvSpPr>
+          <p:cNvPr id="4" name="Content Placeholder 3">
+            <a:extLst>
+              <a:ext uri="{FF2B5EF4-FFF2-40B4-BE49-F238E27FC236}">
+                <a16:creationId xmlns:a16="http://schemas.microsoft.com/office/drawing/2014/main" id="{AB45AAD4-EB5D-4F98-B652-0201F71B03BE}"/>
+              </a:ext>
+            </a:extLst>
+          </p:cNvPr>
+          <p:cNvSpPr>
+            <a:spLocks noGrp="1"/>
+          </p:cNvSpPr>
+          <p:nvPr>
+            <p:ph sz="quarter" idx="13"/>
+          </p:nvPr>
+        </p:nvSpPr>
+        <p:spPr>
+          <a:xfrm>
+            <a:off x="2883876" y="1793631"/>
+            <a:ext cx="5574323" cy="4967654"/>
+          </a:xfrm>
+        </p:spPr>
+        <p:txBody>
+          <a:bodyPr/>
+          <a:lstStyle/>
+          <a:p>
+            <a:r>
+              <a:rPr lang="en-US" dirty="0"/>
+              <a:t>Adjacent statements</a:t>
+            </a:r>
+          </a:p>
+          <a:p>
+            <a:r>
+              <a:rPr lang="en-US" dirty="0"/>
+              <a:t>2 fields in same class</a:t>
+            </a:r>
+          </a:p>
+          <a:p>
+            <a:r>
+              <a:rPr lang="en-US" dirty="0"/>
+              <a:t>2 methods in same class</a:t>
+            </a:r>
+          </a:p>
+          <a:p>
+            <a:r>
+              <a:rPr lang="en-US" dirty="0"/>
+              <a:t>Inheritance</a:t>
+            </a:r>
+          </a:p>
+          <a:p>
+            <a:r>
+              <a:rPr lang="en-US" dirty="0"/>
+              <a:t>Interface implementation</a:t>
+            </a:r>
+          </a:p>
+          <a:p>
+            <a:r>
+              <a:rPr lang="en-US" dirty="0"/>
+              <a:t>Function composition</a:t>
+            </a:r>
+          </a:p>
+          <a:p>
+            <a:r>
+              <a:rPr lang="en-US" dirty="0"/>
+              <a:t>2</a:t>
+            </a:r>
+            <a:r>
+              <a:rPr lang="en-US" baseline="30000" dirty="0"/>
+              <a:t>nd</a:t>
+            </a:r>
+            <a:r>
+              <a:rPr lang="en-US" dirty="0"/>
+              <a:t> order function</a:t>
+            </a:r>
+          </a:p>
+          <a:p>
+            <a:r>
+              <a:rPr lang="en-US" dirty="0"/>
+              <a:t>Monad</a:t>
+            </a:r>
+          </a:p>
+          <a:p>
+            <a:r>
+              <a:rPr lang="en-US" dirty="0"/>
+              <a:t>Shared data transfer object (DTO)</a:t>
+            </a:r>
+          </a:p>
+          <a:p>
+            <a:r>
+              <a:rPr lang="en-US" dirty="0"/>
+              <a:t>Asynchronous message bus with pub/sub</a:t>
+            </a:r>
+          </a:p>
+        </p:txBody>
+      </p:sp>
+      <p:cxnSp>
+        <p:nvCxnSpPr>
+          <p:cNvPr id="6" name="Straight Arrow Connector 5">
+            <a:extLst>
+              <a:ext uri="{FF2B5EF4-FFF2-40B4-BE49-F238E27FC236}">
+                <a16:creationId xmlns:a16="http://schemas.microsoft.com/office/drawing/2014/main" id="{1D278D32-4AE7-415A-B08A-37BE6CDE6E16}"/>
+              </a:ext>
+            </a:extLst>
+          </p:cNvPr>
+          <p:cNvCxnSpPr/>
+          <p:nvPr/>
+        </p:nvCxnSpPr>
+        <p:spPr>
+          <a:xfrm>
+            <a:off x="2250831" y="1969477"/>
+            <a:ext cx="0" cy="4580792"/>
+          </a:xfrm>
+          <a:prstGeom prst="straightConnector1">
+            <a:avLst/>
+          </a:prstGeom>
+          <a:ln>
+            <a:headEnd type="triangle"/>
+            <a:tailEnd type="triangle"/>
+          </a:ln>
+        </p:spPr>
+        <p:style>
+          <a:lnRef idx="1">
+            <a:schemeClr val="accent1"/>
+          </a:lnRef>
+          <a:fillRef idx="0">
+            <a:schemeClr val="accent1"/>
+          </a:fillRef>
+          <a:effectRef idx="0">
+            <a:schemeClr val="accent1"/>
+          </a:effectRef>
+          <a:fontRef idx="minor">
+            <a:schemeClr val="tx1"/>
+          </a:fontRef>
+        </p:style>
+      </p:cxnSp>
+      <p:sp>
+        <p:nvSpPr>
+          <p:cNvPr id="7" name="TextBox 6">
+            <a:extLst>
+              <a:ext uri="{FF2B5EF4-FFF2-40B4-BE49-F238E27FC236}">
+                <a16:creationId xmlns:a16="http://schemas.microsoft.com/office/drawing/2014/main" id="{E6F34AEF-CEF7-4F59-8A5D-35AC9D1F3291}"/>
+              </a:ext>
+            </a:extLst>
+          </p:cNvPr>
+          <p:cNvSpPr txBox="1"/>
+          <p:nvPr/>
+        </p:nvSpPr>
+        <p:spPr>
+          <a:xfrm>
+            <a:off x="202223" y="1969477"/>
+            <a:ext cx="1614545" cy="369332"/>
+          </a:xfrm>
+          <a:prstGeom prst="rect">
+            <a:avLst/>
+          </a:prstGeom>
+          <a:noFill/>
+        </p:spPr>
+        <p:txBody>
+          <a:bodyPr wrap="none" rtlCol="0">
+            <a:spAutoFit/>
+          </a:bodyPr>
+          <a:lstStyle/>
+          <a:p>
+            <a:r>
+              <a:rPr lang="en-US" dirty="0"/>
+              <a:t>More coupled</a:t>
+            </a:r>
+          </a:p>
+        </p:txBody>
+      </p:sp>
+      <p:sp>
+        <p:nvSpPr>
+          <p:cNvPr id="8" name="TextBox 7">
+            <a:extLst>
+              <a:ext uri="{FF2B5EF4-FFF2-40B4-BE49-F238E27FC236}">
+                <a16:creationId xmlns:a16="http://schemas.microsoft.com/office/drawing/2014/main" id="{20ACE1C5-3B6F-49E6-AD7A-A981D9248786}"/>
+              </a:ext>
+            </a:extLst>
+          </p:cNvPr>
+          <p:cNvSpPr txBox="1"/>
+          <p:nvPr/>
+        </p:nvSpPr>
+        <p:spPr>
+          <a:xfrm>
+            <a:off x="202223" y="6180937"/>
+            <a:ext cx="1556836" cy="369332"/>
+          </a:xfrm>
+          <a:prstGeom prst="rect">
+            <a:avLst/>
+          </a:prstGeom>
+          <a:noFill/>
+        </p:spPr>
+        <p:txBody>
+          <a:bodyPr wrap="none" rtlCol="0">
+            <a:spAutoFit/>
+          </a:bodyPr>
+          <a:lstStyle/>
+          <a:p>
+            <a:r>
+              <a:rPr lang="en-US" dirty="0"/>
+              <a:t>Less coupled</a:t>
+            </a:r>
+          </a:p>
+        </p:txBody>
+      </p:sp>
+      <p:cxnSp>
+        <p:nvCxnSpPr>
+          <p:cNvPr id="10" name="Straight Connector 9">
+            <a:extLst>
+              <a:ext uri="{FF2B5EF4-FFF2-40B4-BE49-F238E27FC236}">
+                <a16:creationId xmlns:a16="http://schemas.microsoft.com/office/drawing/2014/main" id="{4EDF26C6-91E9-4361-9A29-233EE33E87FA}"/>
+              </a:ext>
+            </a:extLst>
+          </p:cNvPr>
+          <p:cNvCxnSpPr>
+            <a:cxnSpLocks/>
+          </p:cNvCxnSpPr>
+          <p:nvPr/>
+        </p:nvCxnSpPr>
+        <p:spPr>
+          <a:xfrm>
+            <a:off x="202223" y="4259873"/>
+            <a:ext cx="8255976" cy="0"/>
+          </a:xfrm>
+          <a:prstGeom prst="line">
+            <a:avLst/>
+          </a:prstGeom>
+          <a:ln>
+            <a:prstDash val="dash"/>
+          </a:ln>
+        </p:spPr>
+        <p:style>
+          <a:lnRef idx="1">
+            <a:schemeClr val="accent1"/>
+          </a:lnRef>
+          <a:fillRef idx="0">
+            <a:schemeClr val="accent1"/>
+          </a:fillRef>
+          <a:effectRef idx="0">
+            <a:schemeClr val="accent1"/>
+          </a:effectRef>
+          <a:fontRef idx="minor">
+            <a:schemeClr val="tx1"/>
+          </a:fontRef>
+        </p:style>
+      </p:cxnSp>
+    </p:spTree>
+    <p:extLst>
+      <p:ext uri="{BB962C8B-B14F-4D97-AF65-F5344CB8AC3E}">
+        <p14:creationId xmlns:p14="http://schemas.microsoft.com/office/powerpoint/2010/main" val="3205191857"/>
+      </p:ext>
+    </p:extLst>
+  </p:cSld>
+  <p:clrMapOvr>
+    <a:masterClrMapping/>
+  </p:clrMapOvr>
+</p:sld>
+</file>
+
+<file path=ppt/slides/slide12.xml><?xml version="1.0" encoding="utf-8"?>
+<p:sld xmlns:a="http://schemas.openxmlformats.org/drawingml/2006/main" xmlns:r="http://schemas.openxmlformats.org/officeDocument/2006/relationships" xmlns:p="http://schemas.openxmlformats.org/presentationml/2006/main">
+  <p:cSld>
+    <p:spTree>
+      <p:nvGrpSpPr>
+        <p:cNvPr id="1" name=""/>
+        <p:cNvGrpSpPr/>
+        <p:nvPr/>
+      </p:nvGrpSpPr>
+      <p:grpSpPr>
+        <a:xfrm>
+          <a:off x="0" y="0"/>
+          <a:ext cx="0" cy="0"/>
+          <a:chOff x="0" y="0"/>
+          <a:chExt cx="0" cy="0"/>
+        </a:xfrm>
+      </p:grpSpPr>
+      <p:sp>
+        <p:nvSpPr>
+          <p:cNvPr id="2" name="Title 1">
+            <a:extLst>
+              <a:ext uri="{FF2B5EF4-FFF2-40B4-BE49-F238E27FC236}">
+                <a16:creationId xmlns:a16="http://schemas.microsoft.com/office/drawing/2014/main" id="{F9335735-30EA-47B9-B8DC-0A14B4EBDEF1}"/>
+              </a:ext>
+            </a:extLst>
+          </p:cNvPr>
+          <p:cNvSpPr>
+            <a:spLocks noGrp="1"/>
+          </p:cNvSpPr>
+          <p:nvPr>
+            <p:ph type="title"/>
+          </p:nvPr>
+        </p:nvSpPr>
+        <p:spPr/>
+        <p:txBody>
+          <a:bodyPr/>
+          <a:lstStyle/>
+          <a:p>
+            <a:r>
+              <a:rPr lang="en-US" dirty="0"/>
+              <a:t>Micro-tests verify one aspect of one behavior of one method, without executing or specifying anything else.</a:t>
+            </a:r>
+          </a:p>
+        </p:txBody>
+      </p:sp>
+      <p:sp>
+        <p:nvSpPr>
+          <p:cNvPr id="5" name="Text Placeholder 4">
+            <a:extLst>
+              <a:ext uri="{FF2B5EF4-FFF2-40B4-BE49-F238E27FC236}">
+                <a16:creationId xmlns:a16="http://schemas.microsoft.com/office/drawing/2014/main" id="{006A4A74-4775-41CC-A78B-48C237FBBAC0}"/>
+              </a:ext>
+            </a:extLst>
+          </p:cNvPr>
+          <p:cNvSpPr>
+            <a:spLocks noGrp="1"/>
+          </p:cNvSpPr>
+          <p:nvPr>
+            <p:ph type="body" sz="half" idx="13"/>
+          </p:nvPr>
+        </p:nvSpPr>
+        <p:spPr/>
+        <p:txBody>
+          <a:bodyPr/>
+          <a:lstStyle/>
+          <a:p>
+            <a:pPr algn="r"/>
+            <a:r>
+              <a:rPr lang="en-US" dirty="0"/>
+              <a:t>Industrial Logic, paraphrased by Arlo</a:t>
+            </a:r>
+          </a:p>
+        </p:txBody>
+      </p:sp>
+      <p:sp>
+        <p:nvSpPr>
+          <p:cNvPr id="4" name="Text Placeholder 3">
+            <a:extLst>
+              <a:ext uri="{FF2B5EF4-FFF2-40B4-BE49-F238E27FC236}">
+                <a16:creationId xmlns:a16="http://schemas.microsoft.com/office/drawing/2014/main" id="{DFB45A62-E515-4DF6-8B92-CDD71D8EFAF6}"/>
+              </a:ext>
+            </a:extLst>
+          </p:cNvPr>
+          <p:cNvSpPr>
+            <a:spLocks noGrp="1"/>
+          </p:cNvSpPr>
+          <p:nvPr>
+            <p:ph type="body" sz="half" idx="2"/>
+          </p:nvPr>
+        </p:nvSpPr>
+        <p:spPr/>
+        <p:txBody>
+          <a:bodyPr>
+            <a:normAutofit/>
+          </a:bodyPr>
+          <a:lstStyle/>
+          <a:p>
+            <a:r>
+              <a:rPr lang="en-US" sz="4800" dirty="0"/>
+              <a:t>Micro-tests</a:t>
+            </a:r>
+          </a:p>
+        </p:txBody>
+      </p:sp>
+    </p:spTree>
+    <p:extLst>
+      <p:ext uri="{BB962C8B-B14F-4D97-AF65-F5344CB8AC3E}">
+        <p14:creationId xmlns:p14="http://schemas.microsoft.com/office/powerpoint/2010/main" val="2793482280"/>
+      </p:ext>
+    </p:extLst>
+  </p:cSld>
+  <p:clrMapOvr>
+    <a:masterClrMapping/>
+  </p:clrMapOvr>
+</p:sld>
+</file>
+
+<file path=ppt/slides/slide13.xml><?xml version="1.0" encoding="utf-8"?>
+<p:sld xmlns:a="http://schemas.openxmlformats.org/drawingml/2006/main" xmlns:r="http://schemas.openxmlformats.org/officeDocument/2006/relationships" xmlns:p="http://schemas.openxmlformats.org/presentationml/2006/main">
+  <p:cSld>
+    <p:spTree>
+      <p:nvGrpSpPr>
+        <p:cNvPr id="1" name=""/>
+        <p:cNvGrpSpPr/>
+        <p:nvPr/>
+      </p:nvGrpSpPr>
+      <p:grpSpPr>
+        <a:xfrm>
+          <a:off x="0" y="0"/>
+          <a:ext cx="0" cy="0"/>
+          <a:chOff x="0" y="0"/>
+          <a:chExt cx="0" cy="0"/>
+        </a:xfrm>
+      </p:grpSpPr>
+      <p:sp>
+        <p:nvSpPr>
+          <p:cNvPr id="2" name="Title 1">
+            <a:extLst>
+              <a:ext uri="{FF2B5EF4-FFF2-40B4-BE49-F238E27FC236}">
+                <a16:creationId xmlns:a16="http://schemas.microsoft.com/office/drawing/2014/main" id="{9392929A-4F3F-400B-855A-1CC40C5C09B2}"/>
+              </a:ext>
+            </a:extLst>
+          </p:cNvPr>
+          <p:cNvSpPr>
+            <a:spLocks noGrp="1"/>
+          </p:cNvSpPr>
+          <p:nvPr>
+            <p:ph type="title"/>
+          </p:nvPr>
+        </p:nvSpPr>
+        <p:spPr/>
+        <p:txBody>
+          <a:bodyPr>
+            <a:normAutofit/>
+          </a:bodyPr>
+          <a:lstStyle/>
+          <a:p>
+            <a:r>
+              <a:rPr lang="en-US" dirty="0"/>
+              <a:t>Test by Refactoring: Becoming Context Neutral</a:t>
+            </a:r>
+          </a:p>
+        </p:txBody>
+      </p:sp>
+    </p:spTree>
+    <p:extLst>
+      <p:ext uri="{BB962C8B-B14F-4D97-AF65-F5344CB8AC3E}">
+        <p14:creationId xmlns:p14="http://schemas.microsoft.com/office/powerpoint/2010/main" val="4044210041"/>
+      </p:ext>
+    </p:extLst>
+  </p:cSld>
+  <p:clrMapOvr>
+    <a:masterClrMapping/>
+  </p:clrMapOvr>
+</p:sld>
+</file>
+
+<file path=ppt/slides/slide14.xml><?xml version="1.0" encoding="utf-8"?>
+<p:sld xmlns:a="http://schemas.openxmlformats.org/drawingml/2006/main" xmlns:r="http://schemas.openxmlformats.org/officeDocument/2006/relationships" xmlns:p="http://schemas.openxmlformats.org/presentationml/2006/main">
+  <p:cSld>
+    <p:spTree>
+      <p:nvGrpSpPr>
+        <p:cNvPr id="1" name=""/>
+        <p:cNvGrpSpPr/>
+        <p:nvPr/>
+      </p:nvGrpSpPr>
+      <p:grpSpPr>
+        <a:xfrm>
+          <a:off x="0" y="0"/>
+          <a:ext cx="0" cy="0"/>
+          <a:chOff x="0" y="0"/>
+          <a:chExt cx="0" cy="0"/>
+        </a:xfrm>
+      </p:grpSpPr>
+      <p:sp>
+        <p:nvSpPr>
+          <p:cNvPr id="2" name="Title 1">
+            <a:extLst>
+              <a:ext uri="{FF2B5EF4-FFF2-40B4-BE49-F238E27FC236}">
+                <a16:creationId xmlns:a16="http://schemas.microsoft.com/office/drawing/2014/main" id="{0823A648-807B-4F42-9A58-55A3022971A8}"/>
+              </a:ext>
+            </a:extLst>
+          </p:cNvPr>
+          <p:cNvSpPr>
+            <a:spLocks noGrp="1"/>
+          </p:cNvSpPr>
+          <p:nvPr>
+            <p:ph type="title"/>
+          </p:nvPr>
+        </p:nvSpPr>
+        <p:spPr/>
+        <p:txBody>
+          <a:bodyPr/>
+          <a:lstStyle/>
+          <a:p>
+            <a:r>
+              <a:rPr lang="en-US" dirty="0"/>
+              <a:t>Acceptance Micro-tests;</a:t>
+            </a:r>
+            <a:br>
+              <a:rPr lang="en-US" dirty="0"/>
+            </a:br>
+            <a:r>
+              <a:rPr lang="en-US" dirty="0"/>
+              <a:t>Test as Spec</a:t>
+            </a:r>
+          </a:p>
+        </p:txBody>
+      </p:sp>
+    </p:spTree>
+    <p:extLst>
+      <p:ext uri="{BB962C8B-B14F-4D97-AF65-F5344CB8AC3E}">
+        <p14:creationId xmlns:p14="http://schemas.microsoft.com/office/powerpoint/2010/main" val="3607897151"/>
+      </p:ext>
+    </p:extLst>
+  </p:cSld>
+  <p:clrMapOvr>
+    <a:masterClrMapping/>
+  </p:clrMapOvr>
+</p:sld>
+</file>
+
+<file path=ppt/slides/slide15.xml><?xml version="1.0" encoding="utf-8"?>
+<p:sld xmlns:a="http://schemas.openxmlformats.org/drawingml/2006/main" xmlns:r="http://schemas.openxmlformats.org/officeDocument/2006/relationships" xmlns:p="http://schemas.openxmlformats.org/presentationml/2006/main">
+  <p:cSld>
+    <p:spTree>
+      <p:nvGrpSpPr>
+        <p:cNvPr id="1" name=""/>
+        <p:cNvGrpSpPr/>
+        <p:nvPr/>
+      </p:nvGrpSpPr>
+      <p:grpSpPr>
+        <a:xfrm>
+          <a:off x="0" y="0"/>
+          <a:ext cx="0" cy="0"/>
+          <a:chOff x="0" y="0"/>
+          <a:chExt cx="0" cy="0"/>
+        </a:xfrm>
+      </p:grpSpPr>
+      <p:sp>
+        <p:nvSpPr>
+          <p:cNvPr id="2" name="Title 1"/>
+          <p:cNvSpPr>
+            <a:spLocks noGrp="1"/>
+          </p:cNvSpPr>
+          <p:nvPr>
+            <p:ph type="title"/>
+          </p:nvPr>
+        </p:nvSpPr>
+        <p:spPr/>
+        <p:txBody>
+          <a:bodyPr/>
+          <a:lstStyle/>
+          <a:p>
+            <a:r>
+              <a:rPr lang="en-US" dirty="0"/>
+              <a:t>Thank You</a:t>
+            </a:r>
+          </a:p>
+        </p:txBody>
+      </p:sp>
+      <p:sp>
+        <p:nvSpPr>
+          <p:cNvPr id="3" name="Content Placeholder 2"/>
+          <p:cNvSpPr>
+            <a:spLocks noGrp="1"/>
+          </p:cNvSpPr>
+          <p:nvPr>
+            <p:ph sz="quarter" idx="13"/>
+          </p:nvPr>
+        </p:nvSpPr>
+        <p:spPr>
+          <a:xfrm>
+            <a:off x="685330" y="2367093"/>
+            <a:ext cx="7772870" cy="4191969"/>
+          </a:xfrm>
+        </p:spPr>
+        <p:txBody>
+          <a:bodyPr/>
+          <a:lstStyle/>
+          <a:p>
+            <a:pPr marL="0" indent="0">
+              <a:buNone/>
+            </a:pPr>
+            <a:r>
+              <a:rPr lang="en-US" dirty="0">
+                <a:hlinkClick r:id="rId2"/>
+              </a:rPr>
+              <a:t>http://bit.ly/PromiscuousPairingPdf</a:t>
+            </a:r>
+            <a:endParaRPr lang="en-US" dirty="0"/>
+          </a:p>
+          <a:p>
+            <a:pPr marL="0" indent="0">
+              <a:buNone/>
+            </a:pPr>
+            <a:r>
+              <a:rPr lang="en-US" dirty="0">
+                <a:hlinkClick r:id="rId3"/>
+              </a:rPr>
+              <a:t>http://bit.ly/AgileEngineeringFluency</a:t>
+            </a:r>
+            <a:endParaRPr lang="en-US" dirty="0"/>
+          </a:p>
+          <a:p>
+            <a:pPr marL="0" indent="0">
+              <a:buNone/>
+            </a:pPr>
+            <a:r>
+              <a:rPr lang="en-US" dirty="0">
+                <a:hlinkClick r:id="rId4"/>
+              </a:rPr>
+              <a:t>http://bit.ly/NamingIsAProcess</a:t>
+            </a:r>
+            <a:endParaRPr lang="en-US" dirty="0"/>
+          </a:p>
+          <a:p>
+            <a:pPr marL="0" indent="0">
+              <a:buNone/>
+            </a:pPr>
+            <a:r>
+              <a:rPr lang="en-US" dirty="0">
+                <a:hlinkClick r:id="rId5"/>
+              </a:rPr>
+              <a:t>http://bit.ly/BugsZeroSlides</a:t>
+            </a:r>
+            <a:r>
+              <a:rPr lang="en-US" dirty="0"/>
+              <a:t> (this talk)</a:t>
+            </a:r>
+          </a:p>
+          <a:p>
+            <a:pPr marL="0" indent="0">
+              <a:buNone/>
+            </a:pPr>
+            <a:endParaRPr lang="en-US" dirty="0"/>
+          </a:p>
+          <a:p>
+            <a:pPr marL="0" indent="0">
+              <a:buNone/>
+            </a:pPr>
+            <a:r>
+              <a:rPr lang="en-US" dirty="0"/>
+              <a:t>@</a:t>
+            </a:r>
+            <a:r>
+              <a:rPr lang="en-US" dirty="0" err="1"/>
+              <a:t>arlobelshee</a:t>
+            </a:r>
+            <a:r>
+              <a:rPr lang="en-US" dirty="0"/>
+              <a:t>, </a:t>
+            </a:r>
+            <a:r>
+              <a:rPr lang="en-US" dirty="0" err="1"/>
+              <a:t>github</a:t>
+            </a:r>
+            <a:r>
+              <a:rPr lang="en-US" dirty="0"/>
+              <a:t>/</a:t>
+            </a:r>
+            <a:r>
+              <a:rPr lang="en-US" dirty="0" err="1"/>
+              <a:t>arlobelshee</a:t>
+            </a:r>
+            <a:r>
+              <a:rPr lang="en-US" dirty="0"/>
+              <a:t>, http://arlobelshee.com/</a:t>
+            </a:r>
+          </a:p>
+          <a:p>
+            <a:endParaRPr lang="en-US" dirty="0"/>
+          </a:p>
+          <a:p>
+            <a:endParaRPr lang="en-US" dirty="0"/>
+          </a:p>
+        </p:txBody>
+      </p:sp>
+    </p:spTree>
+    <p:extLst>
+      <p:ext uri="{BB962C8B-B14F-4D97-AF65-F5344CB8AC3E}">
+        <p14:creationId xmlns:p14="http://schemas.microsoft.com/office/powerpoint/2010/main" val="1814685674"/>
+      </p:ext>
+    </p:extLst>
+  </p:cSld>
+  <p:clrMapOvr>
+    <a:masterClrMapping/>
+  </p:clrMapOvr>
+</p:sld>
+</file>
+
+<file path=ppt/slides/slide16.xml><?xml version="1.0" encoding="utf-8"?>
+<p:sld xmlns:a="http://schemas.openxmlformats.org/drawingml/2006/main" xmlns:r="http://schemas.openxmlformats.org/officeDocument/2006/relationships" xmlns:p="http://schemas.openxmlformats.org/presentationml/2006/main" show="0">
+  <p:cSld>
+    <p:spTree>
+      <p:nvGrpSpPr>
+        <p:cNvPr id="1" name=""/>
+        <p:cNvGrpSpPr/>
+        <p:nvPr/>
+      </p:nvGrpSpPr>
+      <p:grpSpPr>
+        <a:xfrm>
+          <a:off x="0" y="0"/>
+          <a:ext cx="0" cy="0"/>
+          <a:chOff x="0" y="0"/>
+          <a:chExt cx="0" cy="0"/>
+        </a:xfrm>
+      </p:grpSpPr>
+      <p:sp>
+        <p:nvSpPr>
+          <p:cNvPr id="2" name="Title 1"/>
+          <p:cNvSpPr>
+            <a:spLocks noGrp="1"/>
+          </p:cNvSpPr>
+          <p:nvPr>
+            <p:ph type="title"/>
+          </p:nvPr>
+        </p:nvSpPr>
+        <p:spPr/>
+        <p:txBody>
+          <a:bodyPr/>
+          <a:lstStyle/>
+          <a:p>
+            <a:endParaRPr lang="en-US"/>
+          </a:p>
+        </p:txBody>
+      </p:sp>
+      <p:sp>
+        <p:nvSpPr>
+          <p:cNvPr id="3" name="Content Placeholder 2"/>
+          <p:cNvSpPr>
+            <a:spLocks noGrp="1"/>
+          </p:cNvSpPr>
+          <p:nvPr>
+            <p:ph sz="quarter" idx="13"/>
+          </p:nvPr>
+        </p:nvSpPr>
+        <p:spPr/>
+        <p:txBody>
+          <a:bodyPr>
+            <a:normAutofit fontScale="85000" lnSpcReduction="20000"/>
+          </a:bodyPr>
+          <a:lstStyle/>
+          <a:p>
+            <a:r>
+              <a:rPr lang="en-US" dirty="0"/>
+              <a:t>Legacy code is usually seen as a tar-ball, a snarl, an obstacle to effective development. We call it technical debt, and assume that paying it off will be expensive.</a:t>
+            </a:r>
+          </a:p>
+          <a:p>
+            <a:r>
+              <a:rPr lang="en-US" dirty="0"/>
+              <a:t>But legacy code and technical debt can actually work in your favor, especially as you are trying to gain design skill.</a:t>
+            </a:r>
+          </a:p>
+          <a:p>
+            <a:r>
+              <a:rPr lang="en-US" dirty="0"/>
+              <a:t>And at the very least, you can ensure you don’t have to pay much to get rid of it.</a:t>
+            </a:r>
+          </a:p>
+          <a:p>
+            <a:r>
+              <a:rPr lang="en-US" dirty="0"/>
+              <a:t>Learning objectives:</a:t>
+            </a:r>
+          </a:p>
+          <a:p>
+            <a:pPr lvl="1"/>
+            <a:r>
+              <a:rPr lang="en-US" dirty="0"/>
+              <a:t>Understand the cycle of disciplined refactoring (full insight loop)</a:t>
+            </a:r>
+          </a:p>
+          <a:p>
+            <a:pPr lvl="1"/>
+            <a:r>
+              <a:rPr lang="en-US" dirty="0"/>
+              <a:t>See how to learn habits one per day, for fluency</a:t>
+            </a:r>
+          </a:p>
+          <a:p>
+            <a:pPr lvl="1"/>
+            <a:r>
+              <a:rPr lang="en-US" dirty="0"/>
+              <a:t>See how to actually do some </a:t>
+            </a:r>
+            <a:r>
+              <a:rPr lang="en-US" dirty="0" err="1"/>
+              <a:t>refactorings</a:t>
+            </a:r>
+            <a:r>
+              <a:rPr lang="en-US" dirty="0"/>
+              <a:t>; how it </a:t>
+            </a:r>
+            <a:r>
+              <a:rPr lang="en-US"/>
+              <a:t>doesn’t slow me down.</a:t>
+            </a:r>
+            <a:endParaRPr lang="en-US" dirty="0"/>
+          </a:p>
+          <a:p>
+            <a:endParaRPr lang="en-US" dirty="0"/>
+          </a:p>
+        </p:txBody>
+      </p:sp>
+    </p:spTree>
+    <p:extLst>
+      <p:ext uri="{BB962C8B-B14F-4D97-AF65-F5344CB8AC3E}">
+        <p14:creationId xmlns:p14="http://schemas.microsoft.com/office/powerpoint/2010/main" val="2783460656"/>
+      </p:ext>
+    </p:extLst>
+  </p:cSld>
+  <p:clrMapOvr>
+    <a:masterClrMapping/>
+  </p:clrMapOvr>
+</p:sld>
+</file>
+
+<file path=ppt/slides/slide2.xml><?xml version="1.0" encoding="utf-8"?>
+<p:sld xmlns:a="http://schemas.openxmlformats.org/drawingml/2006/main" xmlns:r="http://schemas.openxmlformats.org/officeDocument/2006/relationships" xmlns:p="http://schemas.openxmlformats.org/presentationml/2006/main">
+  <p:cSld>
+    <p:spTree>
+      <p:nvGrpSpPr>
+        <p:cNvPr id="1" name=""/>
+        <p:cNvGrpSpPr/>
+        <p:nvPr/>
+      </p:nvGrpSpPr>
+      <p:grpSpPr>
+        <a:xfrm>
+          <a:off x="0" y="0"/>
+          <a:ext cx="0" cy="0"/>
+          <a:chOff x="0" y="0"/>
+          <a:chExt cx="0" cy="0"/>
+        </a:xfrm>
+      </p:grpSpPr>
+      <p:sp>
+        <p:nvSpPr>
+          <p:cNvPr id="7" name="Title 6">
+            <a:extLst>
+              <a:ext uri="{FF2B5EF4-FFF2-40B4-BE49-F238E27FC236}">
+                <a16:creationId xmlns:a16="http://schemas.microsoft.com/office/drawing/2014/main" id="{9147F18C-CAD3-4E2B-B57C-67E972B29D23}"/>
+              </a:ext>
+            </a:extLst>
+          </p:cNvPr>
+          <p:cNvSpPr>
+            <a:spLocks noGrp="1"/>
+          </p:cNvSpPr>
+          <p:nvPr>
+            <p:ph type="title"/>
+          </p:nvPr>
+        </p:nvSpPr>
+        <p:spPr>
+          <a:xfrm>
+            <a:off x="167054" y="4440195"/>
+            <a:ext cx="8809892" cy="2158313"/>
+          </a:xfrm>
+        </p:spPr>
+        <p:txBody>
+          <a:bodyPr/>
+          <a:lstStyle/>
+          <a:p>
+            <a:r>
+              <a:rPr lang="en-US" dirty="0"/>
+              <a:t>When Everyone is Doing This</a:t>
+            </a:r>
+          </a:p>
+        </p:txBody>
+      </p:sp>
+      <p:pic>
+        <p:nvPicPr>
+          <p:cNvPr id="10" name="Content Placeholder 9" descr="A blurry image of a girl&#10;&#10;Description generated with very high confidence">
+            <a:extLst>
+              <a:ext uri="{FF2B5EF4-FFF2-40B4-BE49-F238E27FC236}">
+                <a16:creationId xmlns:a16="http://schemas.microsoft.com/office/drawing/2014/main" id="{213A1BF2-3402-4789-8E52-CF3CE331A38E}"/>
+              </a:ext>
+            </a:extLst>
+          </p:cNvPr>
+          <p:cNvPicPr>
+            <a:picLocks noGrp="1" noChangeAspect="1"/>
+          </p:cNvPicPr>
+          <p:nvPr>
+            <p:ph sz="quarter" idx="13"/>
+          </p:nvPr>
+        </p:nvPicPr>
+        <p:blipFill>
+          <a:blip r:embed="rId2">
+            <a:extLst>
+              <a:ext uri="{28A0092B-C50C-407E-A947-70E740481C1C}">
+                <a14:useLocalDpi xmlns:a14="http://schemas.microsoft.com/office/drawing/2010/main" val="0"/>
+              </a:ext>
+            </a:extLst>
+          </a:blip>
+          <a:stretch>
+            <a:fillRect/>
+          </a:stretch>
+        </p:blipFill>
+        <p:spPr>
+          <a:xfrm>
+            <a:off x="0" y="-201636"/>
+            <a:ext cx="9144000" cy="5151120"/>
+          </a:xfrm>
+        </p:spPr>
+      </p:pic>
+    </p:spTree>
+    <p:extLst>
+      <p:ext uri="{BB962C8B-B14F-4D97-AF65-F5344CB8AC3E}">
+        <p14:creationId xmlns:p14="http://schemas.microsoft.com/office/powerpoint/2010/main" val="1191463382"/>
+      </p:ext>
+    </p:extLst>
+  </p:cSld>
+  <p:clrMapOvr>
+    <a:masterClrMapping/>
+  </p:clrMapOvr>
+</p:sld>
+</file>
+
+<file path=ppt/slides/slide3.xml><?xml version="1.0" encoding="utf-8"?>
+<p:sld xmlns:a="http://schemas.openxmlformats.org/drawingml/2006/main" xmlns:r="http://schemas.openxmlformats.org/officeDocument/2006/relationships" xmlns:p="http://schemas.openxmlformats.org/presentationml/2006/main">
+  <p:cSld>
+    <p:spTree>
+      <p:nvGrpSpPr>
+        <p:cNvPr id="1" name=""/>
+        <p:cNvGrpSpPr/>
+        <p:nvPr/>
+      </p:nvGrpSpPr>
+      <p:grpSpPr>
+        <a:xfrm>
+          <a:off x="0" y="0"/>
+          <a:ext cx="0" cy="0"/>
+          <a:chOff x="0" y="0"/>
+          <a:chExt cx="0" cy="0"/>
+        </a:xfrm>
+      </p:grpSpPr>
+      <p:sp>
+        <p:nvSpPr>
+          <p:cNvPr id="2" name="Title 1">
+            <a:extLst>
+              <a:ext uri="{FF2B5EF4-FFF2-40B4-BE49-F238E27FC236}">
+                <a16:creationId xmlns:a16="http://schemas.microsoft.com/office/drawing/2014/main" id="{616DEE66-22CE-486C-82EF-4DB7CB308D0B}"/>
+              </a:ext>
+            </a:extLst>
+          </p:cNvPr>
+          <p:cNvSpPr>
+            <a:spLocks noGrp="1"/>
+          </p:cNvSpPr>
+          <p:nvPr>
+            <p:ph type="title"/>
+          </p:nvPr>
+        </p:nvSpPr>
+        <p:spPr/>
+        <p:txBody>
+          <a:bodyPr/>
+          <a:lstStyle/>
+          <a:p>
+            <a:r>
+              <a:rPr lang="en-US" dirty="0"/>
+              <a:t>You Can Do This</a:t>
+            </a:r>
+          </a:p>
+        </p:txBody>
+      </p:sp>
+      <p:pic>
+        <p:nvPicPr>
+          <p:cNvPr id="5" name="Content Placeholder 4" descr="A silhouette of a person&#10;&#10;Description generated with very high confidence">
+            <a:extLst>
+              <a:ext uri="{FF2B5EF4-FFF2-40B4-BE49-F238E27FC236}">
+                <a16:creationId xmlns:a16="http://schemas.microsoft.com/office/drawing/2014/main" id="{57BE6F6F-941B-4C70-BA72-EDD2380DCF25}"/>
+              </a:ext>
+            </a:extLst>
+          </p:cNvPr>
+          <p:cNvPicPr>
+            <a:picLocks noGrp="1" noChangeAspect="1"/>
+          </p:cNvPicPr>
+          <p:nvPr>
+            <p:ph sz="quarter" idx="13"/>
+          </p:nvPr>
+        </p:nvPicPr>
+        <p:blipFill rotWithShape="1">
+          <a:blip r:embed="rId2">
+            <a:extLst>
+              <a:ext uri="{28A0092B-C50C-407E-A947-70E740481C1C}">
+                <a14:useLocalDpi xmlns:a14="http://schemas.microsoft.com/office/drawing/2010/main" val="0"/>
+              </a:ext>
+            </a:extLst>
+          </a:blip>
+          <a:srcRect t="12499" b="5001"/>
+          <a:stretch/>
+        </p:blipFill>
+        <p:spPr>
+          <a:xfrm>
+            <a:off x="0" y="0"/>
+            <a:ext cx="9144000" cy="5029200"/>
+          </a:xfrm>
+        </p:spPr>
+      </p:pic>
+    </p:spTree>
+    <p:extLst>
+      <p:ext uri="{BB962C8B-B14F-4D97-AF65-F5344CB8AC3E}">
+        <p14:creationId xmlns:p14="http://schemas.microsoft.com/office/powerpoint/2010/main" val="2549008781"/>
+      </p:ext>
+    </p:extLst>
+  </p:cSld>
+  <p:clrMapOvr>
+    <a:masterClrMapping/>
+  </p:clrMapOvr>
+</p:sld>
+</file>
+
+<file path=ppt/slides/slide4.xml><?xml version="1.0" encoding="utf-8"?>
+<p:sld xmlns:a="http://schemas.openxmlformats.org/drawingml/2006/main" xmlns:r="http://schemas.openxmlformats.org/officeDocument/2006/relationships" xmlns:p="http://schemas.openxmlformats.org/presentationml/2006/main">
+  <p:cSld>
+    <p:spTree>
+      <p:nvGrpSpPr>
+        <p:cNvPr id="1" name=""/>
+        <p:cNvGrpSpPr/>
+        <p:nvPr/>
+      </p:nvGrpSpPr>
+      <p:grpSpPr>
+        <a:xfrm>
+          <a:off x="0" y="0"/>
+          <a:ext cx="0" cy="0"/>
+          <a:chOff x="0" y="0"/>
+          <a:chExt cx="0" cy="0"/>
+        </a:xfrm>
+      </p:grpSpPr>
+      <p:sp>
+        <p:nvSpPr>
+          <p:cNvPr id="2" name="Title 1">
+            <a:extLst>
+              <a:ext uri="{FF2B5EF4-FFF2-40B4-BE49-F238E27FC236}">
+                <a16:creationId xmlns:a16="http://schemas.microsoft.com/office/drawing/2014/main" id="{D731C687-1599-445E-9795-6CAE26FA2AFD}"/>
+              </a:ext>
+            </a:extLst>
+          </p:cNvPr>
+          <p:cNvSpPr>
+            <a:spLocks noGrp="1"/>
+          </p:cNvSpPr>
+          <p:nvPr>
+            <p:ph type="title"/>
+          </p:nvPr>
+        </p:nvSpPr>
+        <p:spPr/>
+        <p:txBody>
+          <a:bodyPr/>
+          <a:lstStyle/>
+          <a:p>
+            <a:r>
+              <a:rPr lang="en-US" dirty="0"/>
+              <a:t>Insight Loop</a:t>
+            </a:r>
+          </a:p>
+        </p:txBody>
+      </p:sp>
+      <p:graphicFrame>
+        <p:nvGraphicFramePr>
+          <p:cNvPr id="4" name="Content Placeholder 3">
+            <a:extLst>
+              <a:ext uri="{FF2B5EF4-FFF2-40B4-BE49-F238E27FC236}">
+                <a16:creationId xmlns:a16="http://schemas.microsoft.com/office/drawing/2014/main" id="{1C9663ED-BCCB-4B86-B47D-DEB7EFE44EB2}"/>
+              </a:ext>
+            </a:extLst>
+          </p:cNvPr>
+          <p:cNvGraphicFramePr>
+            <a:graphicFrameLocks noGrp="1"/>
+          </p:cNvGraphicFramePr>
+          <p:nvPr>
+            <p:ph sz="quarter" idx="13"/>
+            <p:extLst>
+              <p:ext uri="{D42A27DB-BD31-4B8C-83A1-F6EECF244321}">
+                <p14:modId xmlns:p14="http://schemas.microsoft.com/office/powerpoint/2010/main" val="3772936454"/>
+              </p:ext>
+            </p:extLst>
+          </p:nvPr>
+        </p:nvGraphicFramePr>
+        <p:xfrm>
+          <a:off x="0" y="2022232"/>
+          <a:ext cx="9144000" cy="4448906"/>
+        </p:xfrm>
+        <a:graphic>
+          <a:graphicData uri="http://schemas.openxmlformats.org/drawingml/2006/diagram">
+            <dgm:relIds xmlns:dgm="http://schemas.openxmlformats.org/drawingml/2006/diagram" xmlns:r="http://schemas.openxmlformats.org/officeDocument/2006/relationships" r:dm="rId2" r:lo="rId3" r:qs="rId4" r:cs="rId5"/>
+          </a:graphicData>
+        </a:graphic>
+      </p:graphicFrame>
+    </p:spTree>
+    <p:extLst>
+      <p:ext uri="{BB962C8B-B14F-4D97-AF65-F5344CB8AC3E}">
+        <p14:creationId xmlns:p14="http://schemas.microsoft.com/office/powerpoint/2010/main" val="490106897"/>
+      </p:ext>
+    </p:extLst>
+  </p:cSld>
+  <p:clrMapOvr>
+    <a:masterClrMapping/>
+  </p:clrMapOvr>
+</p:sld>
+</file>
+
+<file path=ppt/slides/slide5.xml><?xml version="1.0" encoding="utf-8"?>
+<p:sld xmlns:a="http://schemas.openxmlformats.org/drawingml/2006/main" xmlns:r="http://schemas.openxmlformats.org/officeDocument/2006/relationships" xmlns:p="http://schemas.openxmlformats.org/presentationml/2006/main">
+  <p:cSld>
+    <p:spTree>
+      <p:nvGrpSpPr>
+        <p:cNvPr id="1" name=""/>
+        <p:cNvGrpSpPr/>
+        <p:nvPr/>
+      </p:nvGrpSpPr>
+      <p:grpSpPr>
+        <a:xfrm>
+          <a:off x="0" y="0"/>
+          <a:ext cx="0" cy="0"/>
+          <a:chOff x="0" y="0"/>
+          <a:chExt cx="0" cy="0"/>
+        </a:xfrm>
+      </p:grpSpPr>
+      <p:sp>
+        <p:nvSpPr>
+          <p:cNvPr id="2" name="Title 1">
+            <a:extLst>
+              <a:ext uri="{FF2B5EF4-FFF2-40B4-BE49-F238E27FC236}">
+                <a16:creationId xmlns:a16="http://schemas.microsoft.com/office/drawing/2014/main" id="{D639881A-189A-4824-9318-668F9E2A9B1A}"/>
+              </a:ext>
+            </a:extLst>
+          </p:cNvPr>
+          <p:cNvSpPr>
+            <a:spLocks noGrp="1"/>
+          </p:cNvSpPr>
+          <p:nvPr>
+            <p:ph type="title"/>
+          </p:nvPr>
+        </p:nvSpPr>
+        <p:spPr/>
+        <p:txBody>
+          <a:bodyPr/>
+          <a:lstStyle/>
+          <a:p>
+            <a:r>
+              <a:rPr lang="en-US" dirty="0"/>
+              <a:t>TDD Gets the Press;</a:t>
+            </a:r>
+            <a:br>
+              <a:rPr lang="en-US" dirty="0"/>
+            </a:br>
+            <a:r>
+              <a:rPr lang="en-US" dirty="0"/>
+              <a:t>Refactoring Gets the Results</a:t>
+            </a:r>
+          </a:p>
+        </p:txBody>
+      </p:sp>
+      <p:sp>
+        <p:nvSpPr>
+          <p:cNvPr id="3" name="Content Placeholder 2">
+            <a:extLst>
+              <a:ext uri="{FF2B5EF4-FFF2-40B4-BE49-F238E27FC236}">
+                <a16:creationId xmlns:a16="http://schemas.microsoft.com/office/drawing/2014/main" id="{C94B4304-96EB-402D-B301-6419BDE30B51}"/>
+              </a:ext>
+            </a:extLst>
+          </p:cNvPr>
+          <p:cNvSpPr>
+            <a:spLocks noGrp="1"/>
+          </p:cNvSpPr>
+          <p:nvPr>
+            <p:ph sz="quarter" idx="4294967295"/>
+          </p:nvPr>
+        </p:nvSpPr>
+        <p:spPr>
+          <a:xfrm>
+            <a:off x="0" y="2366963"/>
+            <a:ext cx="7772400" cy="3424237"/>
+          </a:xfrm>
+        </p:spPr>
+        <p:txBody>
+          <a:bodyPr/>
+          <a:lstStyle/>
+          <a:p>
+            <a:r>
+              <a:rPr lang="en-US" dirty="0"/>
+              <a:t>And it’s not that simple…</a:t>
+            </a:r>
+          </a:p>
+        </p:txBody>
+      </p:sp>
+    </p:spTree>
+    <p:extLst>
+      <p:ext uri="{BB962C8B-B14F-4D97-AF65-F5344CB8AC3E}">
+        <p14:creationId xmlns:p14="http://schemas.microsoft.com/office/powerpoint/2010/main" val="2838673724"/>
+      </p:ext>
+    </p:extLst>
+  </p:cSld>
+  <p:clrMapOvr>
+    <a:masterClrMapping/>
+  </p:clrMapOvr>
+</p:sld>
+</file>
+
+<file path=ppt/slides/slide6.xml><?xml version="1.0" encoding="utf-8"?>
+<p:sld xmlns:a="http://schemas.openxmlformats.org/drawingml/2006/main" xmlns:r="http://schemas.openxmlformats.org/officeDocument/2006/relationships" xmlns:p="http://schemas.openxmlformats.org/presentationml/2006/main">
+  <p:cSld>
+    <p:spTree>
+      <p:nvGrpSpPr>
+        <p:cNvPr id="1" name=""/>
+        <p:cNvGrpSpPr/>
+        <p:nvPr/>
+      </p:nvGrpSpPr>
+      <p:grpSpPr>
+        <a:xfrm>
+          <a:off x="0" y="0"/>
+          <a:ext cx="0" cy="0"/>
+          <a:chOff x="0" y="0"/>
+          <a:chExt cx="0" cy="0"/>
+        </a:xfrm>
+      </p:grpSpPr>
+      <p:sp>
+        <p:nvSpPr>
+          <p:cNvPr id="2" name="Title 1">
+            <a:extLst>
+              <a:ext uri="{FF2B5EF4-FFF2-40B4-BE49-F238E27FC236}">
+                <a16:creationId xmlns:a16="http://schemas.microsoft.com/office/drawing/2014/main" id="{3E7E12B6-3CAA-4C97-8BDF-5CEE0A0E71C3}"/>
+              </a:ext>
+            </a:extLst>
+          </p:cNvPr>
+          <p:cNvSpPr>
+            <a:spLocks noGrp="1"/>
+          </p:cNvSpPr>
+          <p:nvPr>
+            <p:ph type="title"/>
+          </p:nvPr>
+        </p:nvSpPr>
+        <p:spPr/>
+        <p:txBody>
+          <a:bodyPr>
+            <a:normAutofit fontScale="90000"/>
+          </a:bodyPr>
+          <a:lstStyle/>
+          <a:p>
+            <a:r>
+              <a:rPr lang="en-US" dirty="0"/>
+              <a:t>Refactoring Legacy is Easy;</a:t>
+            </a:r>
+            <a:br>
+              <a:rPr lang="en-US" dirty="0"/>
+            </a:br>
+            <a:r>
+              <a:rPr lang="en-US" dirty="0"/>
+              <a:t>Refactoring Greenfield is Hard</a:t>
+            </a:r>
+          </a:p>
+        </p:txBody>
+      </p:sp>
+    </p:spTree>
+    <p:extLst>
+      <p:ext uri="{BB962C8B-B14F-4D97-AF65-F5344CB8AC3E}">
+        <p14:creationId xmlns:p14="http://schemas.microsoft.com/office/powerpoint/2010/main" val="2172297416"/>
+      </p:ext>
+    </p:extLst>
+  </p:cSld>
+  <p:clrMapOvr>
+    <a:masterClrMapping/>
+  </p:clrMapOvr>
+</p:sld>
+</file>
+
+<file path=ppt/slides/slide7.xml><?xml version="1.0" encoding="utf-8"?>
+<p:sld xmlns:a="http://schemas.openxmlformats.org/drawingml/2006/main" xmlns:r="http://schemas.openxmlformats.org/officeDocument/2006/relationships" xmlns:p="http://schemas.openxmlformats.org/presentationml/2006/main">
+  <p:cSld>
+    <p:spTree>
+      <p:nvGrpSpPr>
+        <p:cNvPr id="1" name=""/>
+        <p:cNvGrpSpPr/>
+        <p:nvPr/>
+      </p:nvGrpSpPr>
+      <p:grpSpPr>
+        <a:xfrm>
+          <a:off x="0" y="0"/>
+          <a:ext cx="0" cy="0"/>
+          <a:chOff x="0" y="0"/>
+          <a:chExt cx="0" cy="0"/>
+        </a:xfrm>
+      </p:grpSpPr>
+      <p:sp>
+        <p:nvSpPr>
+          <p:cNvPr id="2" name="Title 1">
+            <a:extLst>
+              <a:ext uri="{FF2B5EF4-FFF2-40B4-BE49-F238E27FC236}">
+                <a16:creationId xmlns:a16="http://schemas.microsoft.com/office/drawing/2014/main" id="{01455375-DFD8-4C0B-BED6-BE443F641A71}"/>
+              </a:ext>
+            </a:extLst>
+          </p:cNvPr>
+          <p:cNvSpPr>
+            <a:spLocks noGrp="1"/>
+          </p:cNvSpPr>
+          <p:nvPr>
+            <p:ph type="title"/>
+          </p:nvPr>
+        </p:nvSpPr>
+        <p:spPr>
+          <a:xfrm>
+            <a:off x="685331" y="316523"/>
+            <a:ext cx="7763814" cy="6224954"/>
+          </a:xfrm>
+        </p:spPr>
+        <p:txBody>
+          <a:bodyPr/>
+          <a:lstStyle/>
+          <a:p>
+            <a:r>
+              <a:rPr lang="en-US" dirty="0"/>
+              <a:t>Design by Listening;</a:t>
+            </a:r>
+            <a:br>
+              <a:rPr lang="en-US" dirty="0"/>
+            </a:br>
+            <a:r>
+              <a:rPr lang="en-US" dirty="0"/>
+              <a:t>Big Changes Come From Small Changes</a:t>
+            </a:r>
+          </a:p>
+        </p:txBody>
+      </p:sp>
+    </p:spTree>
+    <p:extLst>
+      <p:ext uri="{BB962C8B-B14F-4D97-AF65-F5344CB8AC3E}">
+        <p14:creationId xmlns:p14="http://schemas.microsoft.com/office/powerpoint/2010/main" val="4198070965"/>
+      </p:ext>
+    </p:extLst>
+  </p:cSld>
+  <p:clrMapOvr>
+    <a:masterClrMapping/>
+  </p:clrMapOvr>
+</p:sld>
+</file>
+
+<file path=ppt/slides/slide8.xml><?xml version="1.0" encoding="utf-8"?>
+<p:sld xmlns:a="http://schemas.openxmlformats.org/drawingml/2006/main" xmlns:r="http://schemas.openxmlformats.org/officeDocument/2006/relationships" xmlns:p="http://schemas.openxmlformats.org/presentationml/2006/main">
+  <p:cSld>
+    <p:spTree>
+      <p:nvGrpSpPr>
+        <p:cNvPr id="1" name=""/>
+        <p:cNvGrpSpPr/>
+        <p:nvPr/>
+      </p:nvGrpSpPr>
+      <p:grpSpPr>
+        <a:xfrm>
+          <a:off x="0" y="0"/>
+          <a:ext cx="0" cy="0"/>
+          <a:chOff x="0" y="0"/>
+          <a:chExt cx="0" cy="0"/>
+        </a:xfrm>
+      </p:grpSpPr>
+      <p:sp>
+        <p:nvSpPr>
+          <p:cNvPr id="2" name="Title 1">
+            <a:extLst>
+              <a:ext uri="{FF2B5EF4-FFF2-40B4-BE49-F238E27FC236}">
                 <a16:creationId xmlns:a16="http://schemas.microsoft.com/office/drawing/2014/main" id="{E8536A9D-F207-4110-9BC3-145392B20CD6}"/>
               </a:ext>
             </a:extLst>
@@ -8935,7 +10389,7 @@
 </p:sld>
 </file>
 
-<file path=ppt/slides/slide11.xml><?xml version="1.0" encoding="utf-8"?>
+<file path=ppt/slides/slide9.xml><?xml version="1.0" encoding="utf-8"?>
 <p:sld xmlns:a="http://schemas.openxmlformats.org/drawingml/2006/main" xmlns:r="http://schemas.openxmlformats.org/officeDocument/2006/relationships" xmlns:p="http://schemas.openxmlformats.org/presentationml/2006/main">
   <p:cSld>
     <p:spTree>
@@ -9228,1394 +10682,6 @@
     <p:extLst>
       <p:ext uri="{BB962C8B-B14F-4D97-AF65-F5344CB8AC3E}">
         <p14:creationId xmlns:p14="http://schemas.microsoft.com/office/powerpoint/2010/main" val="1694186752"/>
-      </p:ext>
-    </p:extLst>
-  </p:cSld>
-  <p:clrMapOvr>
-    <a:masterClrMapping/>
-  </p:clrMapOvr>
-</p:sld>
-</file>
-
-<file path=ppt/slides/slide12.xml><?xml version="1.0" encoding="utf-8"?>
-<p:sld xmlns:a="http://schemas.openxmlformats.org/drawingml/2006/main" xmlns:r="http://schemas.openxmlformats.org/officeDocument/2006/relationships" xmlns:p="http://schemas.openxmlformats.org/presentationml/2006/main">
-  <p:cSld>
-    <p:spTree>
-      <p:nvGrpSpPr>
-        <p:cNvPr id="1" name=""/>
-        <p:cNvGrpSpPr/>
-        <p:nvPr/>
-      </p:nvGrpSpPr>
-      <p:grpSpPr>
-        <a:xfrm>
-          <a:off x="0" y="0"/>
-          <a:ext cx="0" cy="0"/>
-          <a:chOff x="0" y="0"/>
-          <a:chExt cx="0" cy="0"/>
-        </a:xfrm>
-      </p:grpSpPr>
-      <p:sp>
-        <p:nvSpPr>
-          <p:cNvPr id="2" name="Title 1">
-            <a:extLst>
-              <a:ext uri="{FF2B5EF4-FFF2-40B4-BE49-F238E27FC236}">
-                <a16:creationId xmlns:a16="http://schemas.microsoft.com/office/drawing/2014/main" id="{D3449C7C-F3E6-46A6-AC94-65CC460D1625}"/>
-              </a:ext>
-            </a:extLst>
-          </p:cNvPr>
-          <p:cNvSpPr>
-            <a:spLocks noGrp="1"/>
-          </p:cNvSpPr>
-          <p:nvPr>
-            <p:ph type="title"/>
-          </p:nvPr>
-        </p:nvSpPr>
-        <p:spPr/>
-        <p:txBody>
-          <a:bodyPr/>
-          <a:lstStyle/>
-          <a:p>
-            <a:r>
-              <a:rPr lang="en-US" dirty="0"/>
-              <a:t>Read by Refactoring</a:t>
-            </a:r>
-          </a:p>
-        </p:txBody>
-      </p:sp>
-    </p:spTree>
-    <p:extLst>
-      <p:ext uri="{BB962C8B-B14F-4D97-AF65-F5344CB8AC3E}">
-        <p14:creationId xmlns:p14="http://schemas.microsoft.com/office/powerpoint/2010/main" val="3559773507"/>
-      </p:ext>
-    </p:extLst>
-  </p:cSld>
-  <p:clrMapOvr>
-    <a:masterClrMapping/>
-  </p:clrMapOvr>
-</p:sld>
-</file>
-
-<file path=ppt/slides/slide13.xml><?xml version="1.0" encoding="utf-8"?>
-<p:sld xmlns:a="http://schemas.openxmlformats.org/drawingml/2006/main" xmlns:r="http://schemas.openxmlformats.org/officeDocument/2006/relationships" xmlns:p="http://schemas.openxmlformats.org/presentationml/2006/main">
-  <p:cSld>
-    <p:spTree>
-      <p:nvGrpSpPr>
-        <p:cNvPr id="1" name=""/>
-        <p:cNvGrpSpPr/>
-        <p:nvPr/>
-      </p:nvGrpSpPr>
-      <p:grpSpPr>
-        <a:xfrm>
-          <a:off x="0" y="0"/>
-          <a:ext cx="0" cy="0"/>
-          <a:chOff x="0" y="0"/>
-          <a:chExt cx="0" cy="0"/>
-        </a:xfrm>
-      </p:grpSpPr>
-      <p:sp>
-        <p:nvSpPr>
-          <p:cNvPr id="2" name="Title 1">
-            <a:extLst>
-              <a:ext uri="{FF2B5EF4-FFF2-40B4-BE49-F238E27FC236}">
-                <a16:creationId xmlns:a16="http://schemas.microsoft.com/office/drawing/2014/main" id="{F9335735-30EA-47B9-B8DC-0A14B4EBDEF1}"/>
-              </a:ext>
-            </a:extLst>
-          </p:cNvPr>
-          <p:cNvSpPr>
-            <a:spLocks noGrp="1"/>
-          </p:cNvSpPr>
-          <p:nvPr>
-            <p:ph type="title"/>
-          </p:nvPr>
-        </p:nvSpPr>
-        <p:spPr/>
-        <p:txBody>
-          <a:bodyPr/>
-          <a:lstStyle/>
-          <a:p>
-            <a:r>
-              <a:rPr lang="en-US" dirty="0"/>
-              <a:t>Micro-tests verify one aspect of one behavior of one method, without executing or specifying anything else.</a:t>
-            </a:r>
-          </a:p>
-        </p:txBody>
-      </p:sp>
-      <p:sp>
-        <p:nvSpPr>
-          <p:cNvPr id="5" name="Text Placeholder 4">
-            <a:extLst>
-              <a:ext uri="{FF2B5EF4-FFF2-40B4-BE49-F238E27FC236}">
-                <a16:creationId xmlns:a16="http://schemas.microsoft.com/office/drawing/2014/main" id="{006A4A74-4775-41CC-A78B-48C237FBBAC0}"/>
-              </a:ext>
-            </a:extLst>
-          </p:cNvPr>
-          <p:cNvSpPr>
-            <a:spLocks noGrp="1"/>
-          </p:cNvSpPr>
-          <p:nvPr>
-            <p:ph type="body" sz="half" idx="13"/>
-          </p:nvPr>
-        </p:nvSpPr>
-        <p:spPr/>
-        <p:txBody>
-          <a:bodyPr/>
-          <a:lstStyle/>
-          <a:p>
-            <a:pPr algn="r"/>
-            <a:r>
-              <a:rPr lang="en-US" dirty="0"/>
-              <a:t>Industrial Logic, paraphrased by Arlo</a:t>
-            </a:r>
-          </a:p>
-        </p:txBody>
-      </p:sp>
-      <p:sp>
-        <p:nvSpPr>
-          <p:cNvPr id="4" name="Text Placeholder 3">
-            <a:extLst>
-              <a:ext uri="{FF2B5EF4-FFF2-40B4-BE49-F238E27FC236}">
-                <a16:creationId xmlns:a16="http://schemas.microsoft.com/office/drawing/2014/main" id="{DFB45A62-E515-4DF6-8B92-CDD71D8EFAF6}"/>
-              </a:ext>
-            </a:extLst>
-          </p:cNvPr>
-          <p:cNvSpPr>
-            <a:spLocks noGrp="1"/>
-          </p:cNvSpPr>
-          <p:nvPr>
-            <p:ph type="body" sz="half" idx="2"/>
-          </p:nvPr>
-        </p:nvSpPr>
-        <p:spPr/>
-        <p:txBody>
-          <a:bodyPr>
-            <a:normAutofit/>
-          </a:bodyPr>
-          <a:lstStyle/>
-          <a:p>
-            <a:r>
-              <a:rPr lang="en-US" sz="4800" dirty="0"/>
-              <a:t>Micro-tests</a:t>
-            </a:r>
-          </a:p>
-        </p:txBody>
-      </p:sp>
-    </p:spTree>
-    <p:extLst>
-      <p:ext uri="{BB962C8B-B14F-4D97-AF65-F5344CB8AC3E}">
-        <p14:creationId xmlns:p14="http://schemas.microsoft.com/office/powerpoint/2010/main" val="2793482280"/>
-      </p:ext>
-    </p:extLst>
-  </p:cSld>
-  <p:clrMapOvr>
-    <a:masterClrMapping/>
-  </p:clrMapOvr>
-</p:sld>
-</file>
-
-<file path=ppt/slides/slide14.xml><?xml version="1.0" encoding="utf-8"?>
-<p:sld xmlns:a="http://schemas.openxmlformats.org/drawingml/2006/main" xmlns:r="http://schemas.openxmlformats.org/officeDocument/2006/relationships" xmlns:p="http://schemas.openxmlformats.org/presentationml/2006/main">
-  <p:cSld>
-    <p:spTree>
-      <p:nvGrpSpPr>
-        <p:cNvPr id="1" name=""/>
-        <p:cNvGrpSpPr/>
-        <p:nvPr/>
-      </p:nvGrpSpPr>
-      <p:grpSpPr>
-        <a:xfrm>
-          <a:off x="0" y="0"/>
-          <a:ext cx="0" cy="0"/>
-          <a:chOff x="0" y="0"/>
-          <a:chExt cx="0" cy="0"/>
-        </a:xfrm>
-      </p:grpSpPr>
-      <p:sp>
-        <p:nvSpPr>
-          <p:cNvPr id="2" name="Title 1">
-            <a:extLst>
-              <a:ext uri="{FF2B5EF4-FFF2-40B4-BE49-F238E27FC236}">
-                <a16:creationId xmlns:a16="http://schemas.microsoft.com/office/drawing/2014/main" id="{9392929A-4F3F-400B-855A-1CC40C5C09B2}"/>
-              </a:ext>
-            </a:extLst>
-          </p:cNvPr>
-          <p:cNvSpPr>
-            <a:spLocks noGrp="1"/>
-          </p:cNvSpPr>
-          <p:nvPr>
-            <p:ph type="title"/>
-          </p:nvPr>
-        </p:nvSpPr>
-        <p:spPr/>
-        <p:txBody>
-          <a:bodyPr>
-            <a:normAutofit/>
-          </a:bodyPr>
-          <a:lstStyle/>
-          <a:p>
-            <a:r>
-              <a:rPr lang="en-US" dirty="0"/>
-              <a:t>Test by Refactoring: Becoming Context Neutral</a:t>
-            </a:r>
-          </a:p>
-        </p:txBody>
-      </p:sp>
-    </p:spTree>
-    <p:extLst>
-      <p:ext uri="{BB962C8B-B14F-4D97-AF65-F5344CB8AC3E}">
-        <p14:creationId xmlns:p14="http://schemas.microsoft.com/office/powerpoint/2010/main" val="4044210041"/>
-      </p:ext>
-    </p:extLst>
-  </p:cSld>
-  <p:clrMapOvr>
-    <a:masterClrMapping/>
-  </p:clrMapOvr>
-</p:sld>
-</file>
-
-<file path=ppt/slides/slide15.xml><?xml version="1.0" encoding="utf-8"?>
-<p:sld xmlns:a="http://schemas.openxmlformats.org/drawingml/2006/main" xmlns:r="http://schemas.openxmlformats.org/officeDocument/2006/relationships" xmlns:p="http://schemas.openxmlformats.org/presentationml/2006/main">
-  <p:cSld>
-    <p:spTree>
-      <p:nvGrpSpPr>
-        <p:cNvPr id="1" name=""/>
-        <p:cNvGrpSpPr/>
-        <p:nvPr/>
-      </p:nvGrpSpPr>
-      <p:grpSpPr>
-        <a:xfrm>
-          <a:off x="0" y="0"/>
-          <a:ext cx="0" cy="0"/>
-          <a:chOff x="0" y="0"/>
-          <a:chExt cx="0" cy="0"/>
-        </a:xfrm>
-      </p:grpSpPr>
-      <p:sp>
-        <p:nvSpPr>
-          <p:cNvPr id="2" name="Title 1">
-            <a:extLst>
-              <a:ext uri="{FF2B5EF4-FFF2-40B4-BE49-F238E27FC236}">
-                <a16:creationId xmlns:a16="http://schemas.microsoft.com/office/drawing/2014/main" id="{0823A648-807B-4F42-9A58-55A3022971A8}"/>
-              </a:ext>
-            </a:extLst>
-          </p:cNvPr>
-          <p:cNvSpPr>
-            <a:spLocks noGrp="1"/>
-          </p:cNvSpPr>
-          <p:nvPr>
-            <p:ph type="title"/>
-          </p:nvPr>
-        </p:nvSpPr>
-        <p:spPr/>
-        <p:txBody>
-          <a:bodyPr/>
-          <a:lstStyle/>
-          <a:p>
-            <a:r>
-              <a:rPr lang="en-US" dirty="0"/>
-              <a:t>Acceptance Micro-tests;</a:t>
-            </a:r>
-            <a:br>
-              <a:rPr lang="en-US" dirty="0"/>
-            </a:br>
-            <a:r>
-              <a:rPr lang="en-US" dirty="0"/>
-              <a:t>Test as Spec</a:t>
-            </a:r>
-          </a:p>
-        </p:txBody>
-      </p:sp>
-    </p:spTree>
-    <p:extLst>
-      <p:ext uri="{BB962C8B-B14F-4D97-AF65-F5344CB8AC3E}">
-        <p14:creationId xmlns:p14="http://schemas.microsoft.com/office/powerpoint/2010/main" val="3607897151"/>
-      </p:ext>
-    </p:extLst>
-  </p:cSld>
-  <p:clrMapOvr>
-    <a:masterClrMapping/>
-  </p:clrMapOvr>
-</p:sld>
-</file>
-
-<file path=ppt/slides/slide16.xml><?xml version="1.0" encoding="utf-8"?>
-<p:sld xmlns:a="http://schemas.openxmlformats.org/drawingml/2006/main" xmlns:r="http://schemas.openxmlformats.org/officeDocument/2006/relationships" xmlns:p="http://schemas.openxmlformats.org/presentationml/2006/main">
-  <p:cSld>
-    <p:spTree>
-      <p:nvGrpSpPr>
-        <p:cNvPr id="1" name=""/>
-        <p:cNvGrpSpPr/>
-        <p:nvPr/>
-      </p:nvGrpSpPr>
-      <p:grpSpPr>
-        <a:xfrm>
-          <a:off x="0" y="0"/>
-          <a:ext cx="0" cy="0"/>
-          <a:chOff x="0" y="0"/>
-          <a:chExt cx="0" cy="0"/>
-        </a:xfrm>
-      </p:grpSpPr>
-      <p:sp>
-        <p:nvSpPr>
-          <p:cNvPr id="2" name="Title 1"/>
-          <p:cNvSpPr>
-            <a:spLocks noGrp="1"/>
-          </p:cNvSpPr>
-          <p:nvPr>
-            <p:ph type="title"/>
-          </p:nvPr>
-        </p:nvSpPr>
-        <p:spPr/>
-        <p:txBody>
-          <a:bodyPr/>
-          <a:lstStyle/>
-          <a:p>
-            <a:r>
-              <a:rPr lang="en-US" dirty="0"/>
-              <a:t>Thank You</a:t>
-            </a:r>
-          </a:p>
-        </p:txBody>
-      </p:sp>
-      <p:sp>
-        <p:nvSpPr>
-          <p:cNvPr id="3" name="Content Placeholder 2"/>
-          <p:cNvSpPr>
-            <a:spLocks noGrp="1"/>
-          </p:cNvSpPr>
-          <p:nvPr>
-            <p:ph sz="quarter" idx="13"/>
-          </p:nvPr>
-        </p:nvSpPr>
-        <p:spPr>
-          <a:xfrm>
-            <a:off x="685330" y="2367093"/>
-            <a:ext cx="7772870" cy="4191969"/>
-          </a:xfrm>
-        </p:spPr>
-        <p:txBody>
-          <a:bodyPr/>
-          <a:lstStyle/>
-          <a:p>
-            <a:pPr marL="0" indent="0">
-              <a:buNone/>
-            </a:pPr>
-            <a:r>
-              <a:rPr lang="en-US" dirty="0">
-                <a:hlinkClick r:id="rId2"/>
-              </a:rPr>
-              <a:t>http://bit.ly/PromiscuousPairingPdf</a:t>
-            </a:r>
-            <a:endParaRPr lang="en-US" dirty="0"/>
-          </a:p>
-          <a:p>
-            <a:pPr marL="0" indent="0">
-              <a:buNone/>
-            </a:pPr>
-            <a:r>
-              <a:rPr lang="en-US" dirty="0">
-                <a:hlinkClick r:id="rId3"/>
-              </a:rPr>
-              <a:t>http://bit.ly/AgileEngineeringFluency</a:t>
-            </a:r>
-            <a:endParaRPr lang="en-US" dirty="0"/>
-          </a:p>
-          <a:p>
-            <a:pPr marL="0" indent="0">
-              <a:buNone/>
-            </a:pPr>
-            <a:r>
-              <a:rPr lang="en-US" dirty="0">
-                <a:hlinkClick r:id="rId4"/>
-              </a:rPr>
-              <a:t>http://bit.ly/NamingIsAProcess</a:t>
-            </a:r>
-            <a:endParaRPr lang="en-US" dirty="0"/>
-          </a:p>
-          <a:p>
-            <a:pPr marL="0" indent="0">
-              <a:buNone/>
-            </a:pPr>
-            <a:r>
-              <a:rPr lang="en-US" dirty="0">
-                <a:hlinkClick r:id="rId5"/>
-              </a:rPr>
-              <a:t>http://bit.ly/BugsZeroSlides</a:t>
-            </a:r>
-            <a:r>
-              <a:rPr lang="en-US" dirty="0"/>
-              <a:t> (this talk)</a:t>
-            </a:r>
-          </a:p>
-          <a:p>
-            <a:pPr marL="0" indent="0">
-              <a:buNone/>
-            </a:pPr>
-            <a:endParaRPr lang="en-US" dirty="0"/>
-          </a:p>
-          <a:p>
-            <a:pPr marL="0" indent="0">
-              <a:buNone/>
-            </a:pPr>
-            <a:r>
-              <a:rPr lang="en-US" dirty="0"/>
-              <a:t>@</a:t>
-            </a:r>
-            <a:r>
-              <a:rPr lang="en-US" dirty="0" err="1"/>
-              <a:t>arlobelshee</a:t>
-            </a:r>
-            <a:r>
-              <a:rPr lang="en-US" dirty="0"/>
-              <a:t>, </a:t>
-            </a:r>
-            <a:r>
-              <a:rPr lang="en-US" dirty="0" err="1"/>
-              <a:t>github</a:t>
-            </a:r>
-            <a:r>
-              <a:rPr lang="en-US" dirty="0"/>
-              <a:t>/</a:t>
-            </a:r>
-            <a:r>
-              <a:rPr lang="en-US" dirty="0" err="1"/>
-              <a:t>arlobelshee</a:t>
-            </a:r>
-            <a:r>
-              <a:rPr lang="en-US" dirty="0"/>
-              <a:t>, http://arlobelshee.com/</a:t>
-            </a:r>
-          </a:p>
-          <a:p>
-            <a:endParaRPr lang="en-US" dirty="0"/>
-          </a:p>
-          <a:p>
-            <a:endParaRPr lang="en-US" dirty="0"/>
-          </a:p>
-        </p:txBody>
-      </p:sp>
-    </p:spTree>
-    <p:extLst>
-      <p:ext uri="{BB962C8B-B14F-4D97-AF65-F5344CB8AC3E}">
-        <p14:creationId xmlns:p14="http://schemas.microsoft.com/office/powerpoint/2010/main" val="1814685674"/>
-      </p:ext>
-    </p:extLst>
-  </p:cSld>
-  <p:clrMapOvr>
-    <a:masterClrMapping/>
-  </p:clrMapOvr>
-</p:sld>
-</file>
-
-<file path=ppt/slides/slide17.xml><?xml version="1.0" encoding="utf-8"?>
-<p:sld xmlns:a="http://schemas.openxmlformats.org/drawingml/2006/main" xmlns:r="http://schemas.openxmlformats.org/officeDocument/2006/relationships" xmlns:p="http://schemas.openxmlformats.org/presentationml/2006/main" show="0">
-  <p:cSld>
-    <p:spTree>
-      <p:nvGrpSpPr>
-        <p:cNvPr id="1" name=""/>
-        <p:cNvGrpSpPr/>
-        <p:nvPr/>
-      </p:nvGrpSpPr>
-      <p:grpSpPr>
-        <a:xfrm>
-          <a:off x="0" y="0"/>
-          <a:ext cx="0" cy="0"/>
-          <a:chOff x="0" y="0"/>
-          <a:chExt cx="0" cy="0"/>
-        </a:xfrm>
-      </p:grpSpPr>
-      <p:sp>
-        <p:nvSpPr>
-          <p:cNvPr id="2" name="Title 1"/>
-          <p:cNvSpPr>
-            <a:spLocks noGrp="1"/>
-          </p:cNvSpPr>
-          <p:nvPr>
-            <p:ph type="title"/>
-          </p:nvPr>
-        </p:nvSpPr>
-        <p:spPr/>
-        <p:txBody>
-          <a:bodyPr/>
-          <a:lstStyle/>
-          <a:p>
-            <a:endParaRPr lang="en-US"/>
-          </a:p>
-        </p:txBody>
-      </p:sp>
-      <p:sp>
-        <p:nvSpPr>
-          <p:cNvPr id="3" name="Content Placeholder 2"/>
-          <p:cNvSpPr>
-            <a:spLocks noGrp="1"/>
-          </p:cNvSpPr>
-          <p:nvPr>
-            <p:ph sz="quarter" idx="13"/>
-          </p:nvPr>
-        </p:nvSpPr>
-        <p:spPr/>
-        <p:txBody>
-          <a:bodyPr>
-            <a:normAutofit fontScale="85000" lnSpcReduction="20000"/>
-          </a:bodyPr>
-          <a:lstStyle/>
-          <a:p>
-            <a:r>
-              <a:rPr lang="en-US" dirty="0"/>
-              <a:t>Legacy code is usually seen as a tar-ball, a snarl, an obstacle to effective development. We call it technical debt, and assume that paying it off will be expensive.</a:t>
-            </a:r>
-          </a:p>
-          <a:p>
-            <a:r>
-              <a:rPr lang="en-US" dirty="0"/>
-              <a:t>But legacy code and technical debt can actually work in your favor, especially as you are trying to gain design skill.</a:t>
-            </a:r>
-          </a:p>
-          <a:p>
-            <a:r>
-              <a:rPr lang="en-US" dirty="0"/>
-              <a:t>And at the very least, you can ensure you don’t have to pay much to get rid of it.</a:t>
-            </a:r>
-          </a:p>
-          <a:p>
-            <a:r>
-              <a:rPr lang="en-US" dirty="0"/>
-              <a:t>Learning objectives:</a:t>
-            </a:r>
-          </a:p>
-          <a:p>
-            <a:pPr lvl="1"/>
-            <a:r>
-              <a:rPr lang="en-US" dirty="0"/>
-              <a:t>Understand the cycle of disciplined refactoring (full insight loop)</a:t>
-            </a:r>
-          </a:p>
-          <a:p>
-            <a:pPr lvl="1"/>
-            <a:r>
-              <a:rPr lang="en-US" dirty="0"/>
-              <a:t>See how to learn habits one per day, for fluency</a:t>
-            </a:r>
-          </a:p>
-          <a:p>
-            <a:pPr lvl="1"/>
-            <a:r>
-              <a:rPr lang="en-US" dirty="0"/>
-              <a:t>See how to actually do some </a:t>
-            </a:r>
-            <a:r>
-              <a:rPr lang="en-US" dirty="0" err="1"/>
-              <a:t>refactorings</a:t>
-            </a:r>
-            <a:r>
-              <a:rPr lang="en-US" dirty="0"/>
-              <a:t>; how it </a:t>
-            </a:r>
-            <a:r>
-              <a:rPr lang="en-US"/>
-              <a:t>doesn’t slow me down.</a:t>
-            </a:r>
-            <a:endParaRPr lang="en-US" dirty="0"/>
-          </a:p>
-          <a:p>
-            <a:endParaRPr lang="en-US" dirty="0"/>
-          </a:p>
-        </p:txBody>
-      </p:sp>
-    </p:spTree>
-    <p:extLst>
-      <p:ext uri="{BB962C8B-B14F-4D97-AF65-F5344CB8AC3E}">
-        <p14:creationId xmlns:p14="http://schemas.microsoft.com/office/powerpoint/2010/main" val="2783460656"/>
-      </p:ext>
-    </p:extLst>
-  </p:cSld>
-  <p:clrMapOvr>
-    <a:masterClrMapping/>
-  </p:clrMapOvr>
-</p:sld>
-</file>
-
-<file path=ppt/slides/slide2.xml><?xml version="1.0" encoding="utf-8"?>
-<p:sld xmlns:a="http://schemas.openxmlformats.org/drawingml/2006/main" xmlns:r="http://schemas.openxmlformats.org/officeDocument/2006/relationships" xmlns:p="http://schemas.openxmlformats.org/presentationml/2006/main">
-  <p:cSld>
-    <p:spTree>
-      <p:nvGrpSpPr>
-        <p:cNvPr id="1" name=""/>
-        <p:cNvGrpSpPr/>
-        <p:nvPr/>
-      </p:nvGrpSpPr>
-      <p:grpSpPr>
-        <a:xfrm>
-          <a:off x="0" y="0"/>
-          <a:ext cx="0" cy="0"/>
-          <a:chOff x="0" y="0"/>
-          <a:chExt cx="0" cy="0"/>
-        </a:xfrm>
-      </p:grpSpPr>
-      <p:sp>
-        <p:nvSpPr>
-          <p:cNvPr id="7" name="Title 6">
-            <a:extLst>
-              <a:ext uri="{FF2B5EF4-FFF2-40B4-BE49-F238E27FC236}">
-                <a16:creationId xmlns:a16="http://schemas.microsoft.com/office/drawing/2014/main" id="{9147F18C-CAD3-4E2B-B57C-67E972B29D23}"/>
-              </a:ext>
-            </a:extLst>
-          </p:cNvPr>
-          <p:cNvSpPr>
-            <a:spLocks noGrp="1"/>
-          </p:cNvSpPr>
-          <p:nvPr>
-            <p:ph type="title"/>
-          </p:nvPr>
-        </p:nvSpPr>
-        <p:spPr>
-          <a:xfrm>
-            <a:off x="167054" y="4440195"/>
-            <a:ext cx="8809892" cy="2158313"/>
-          </a:xfrm>
-        </p:spPr>
-        <p:txBody>
-          <a:bodyPr/>
-          <a:lstStyle/>
-          <a:p>
-            <a:r>
-              <a:rPr lang="en-US" dirty="0"/>
-              <a:t>When Everyone is Doing This</a:t>
-            </a:r>
-          </a:p>
-        </p:txBody>
-      </p:sp>
-      <p:pic>
-        <p:nvPicPr>
-          <p:cNvPr id="10" name="Content Placeholder 9" descr="A blurry image of a girl&#10;&#10;Description generated with very high confidence">
-            <a:extLst>
-              <a:ext uri="{FF2B5EF4-FFF2-40B4-BE49-F238E27FC236}">
-                <a16:creationId xmlns:a16="http://schemas.microsoft.com/office/drawing/2014/main" id="{213A1BF2-3402-4789-8E52-CF3CE331A38E}"/>
-              </a:ext>
-            </a:extLst>
-          </p:cNvPr>
-          <p:cNvPicPr>
-            <a:picLocks noGrp="1" noChangeAspect="1"/>
-          </p:cNvPicPr>
-          <p:nvPr>
-            <p:ph sz="quarter" idx="13"/>
-          </p:nvPr>
-        </p:nvPicPr>
-        <p:blipFill>
-          <a:blip r:embed="rId2">
-            <a:extLst>
-              <a:ext uri="{28A0092B-C50C-407E-A947-70E740481C1C}">
-                <a14:useLocalDpi xmlns:a14="http://schemas.microsoft.com/office/drawing/2010/main" val="0"/>
-              </a:ext>
-            </a:extLst>
-          </a:blip>
-          <a:stretch>
-            <a:fillRect/>
-          </a:stretch>
-        </p:blipFill>
-        <p:spPr>
-          <a:xfrm>
-            <a:off x="0" y="-201636"/>
-            <a:ext cx="9144000" cy="5151120"/>
-          </a:xfrm>
-        </p:spPr>
-      </p:pic>
-    </p:spTree>
-    <p:extLst>
-      <p:ext uri="{BB962C8B-B14F-4D97-AF65-F5344CB8AC3E}">
-        <p14:creationId xmlns:p14="http://schemas.microsoft.com/office/powerpoint/2010/main" val="1191463382"/>
-      </p:ext>
-    </p:extLst>
-  </p:cSld>
-  <p:clrMapOvr>
-    <a:masterClrMapping/>
-  </p:clrMapOvr>
-</p:sld>
-</file>
-
-<file path=ppt/slides/slide3.xml><?xml version="1.0" encoding="utf-8"?>
-<p:sld xmlns:a="http://schemas.openxmlformats.org/drawingml/2006/main" xmlns:r="http://schemas.openxmlformats.org/officeDocument/2006/relationships" xmlns:p="http://schemas.openxmlformats.org/presentationml/2006/main">
-  <p:cSld>
-    <p:spTree>
-      <p:nvGrpSpPr>
-        <p:cNvPr id="1" name=""/>
-        <p:cNvGrpSpPr/>
-        <p:nvPr/>
-      </p:nvGrpSpPr>
-      <p:grpSpPr>
-        <a:xfrm>
-          <a:off x="0" y="0"/>
-          <a:ext cx="0" cy="0"/>
-          <a:chOff x="0" y="0"/>
-          <a:chExt cx="0" cy="0"/>
-        </a:xfrm>
-      </p:grpSpPr>
-      <p:sp>
-        <p:nvSpPr>
-          <p:cNvPr id="2" name="Title 1">
-            <a:extLst>
-              <a:ext uri="{FF2B5EF4-FFF2-40B4-BE49-F238E27FC236}">
-                <a16:creationId xmlns:a16="http://schemas.microsoft.com/office/drawing/2014/main" id="{616DEE66-22CE-486C-82EF-4DB7CB308D0B}"/>
-              </a:ext>
-            </a:extLst>
-          </p:cNvPr>
-          <p:cNvSpPr>
-            <a:spLocks noGrp="1"/>
-          </p:cNvSpPr>
-          <p:nvPr>
-            <p:ph type="title"/>
-          </p:nvPr>
-        </p:nvSpPr>
-        <p:spPr/>
-        <p:txBody>
-          <a:bodyPr/>
-          <a:lstStyle/>
-          <a:p>
-            <a:r>
-              <a:rPr lang="en-US" dirty="0"/>
-              <a:t>You Can Do This</a:t>
-            </a:r>
-          </a:p>
-        </p:txBody>
-      </p:sp>
-      <p:pic>
-        <p:nvPicPr>
-          <p:cNvPr id="5" name="Content Placeholder 4" descr="A silhouette of a person&#10;&#10;Description generated with very high confidence">
-            <a:extLst>
-              <a:ext uri="{FF2B5EF4-FFF2-40B4-BE49-F238E27FC236}">
-                <a16:creationId xmlns:a16="http://schemas.microsoft.com/office/drawing/2014/main" id="{57BE6F6F-941B-4C70-BA72-EDD2380DCF25}"/>
-              </a:ext>
-            </a:extLst>
-          </p:cNvPr>
-          <p:cNvPicPr>
-            <a:picLocks noGrp="1" noChangeAspect="1"/>
-          </p:cNvPicPr>
-          <p:nvPr>
-            <p:ph sz="quarter" idx="13"/>
-          </p:nvPr>
-        </p:nvPicPr>
-        <p:blipFill rotWithShape="1">
-          <a:blip r:embed="rId2">
-            <a:extLst>
-              <a:ext uri="{28A0092B-C50C-407E-A947-70E740481C1C}">
-                <a14:useLocalDpi xmlns:a14="http://schemas.microsoft.com/office/drawing/2010/main" val="0"/>
-              </a:ext>
-            </a:extLst>
-          </a:blip>
-          <a:srcRect t="12499" b="5001"/>
-          <a:stretch/>
-        </p:blipFill>
-        <p:spPr>
-          <a:xfrm>
-            <a:off x="0" y="0"/>
-            <a:ext cx="9144000" cy="5029200"/>
-          </a:xfrm>
-        </p:spPr>
-      </p:pic>
-    </p:spTree>
-    <p:extLst>
-      <p:ext uri="{BB962C8B-B14F-4D97-AF65-F5344CB8AC3E}">
-        <p14:creationId xmlns:p14="http://schemas.microsoft.com/office/powerpoint/2010/main" val="2549008781"/>
-      </p:ext>
-    </p:extLst>
-  </p:cSld>
-  <p:clrMapOvr>
-    <a:masterClrMapping/>
-  </p:clrMapOvr>
-</p:sld>
-</file>
-
-<file path=ppt/slides/slide4.xml><?xml version="1.0" encoding="utf-8"?>
-<p:sld xmlns:a="http://schemas.openxmlformats.org/drawingml/2006/main" xmlns:r="http://schemas.openxmlformats.org/officeDocument/2006/relationships" xmlns:p="http://schemas.openxmlformats.org/presentationml/2006/main">
-  <p:cSld>
-    <p:spTree>
-      <p:nvGrpSpPr>
-        <p:cNvPr id="1" name=""/>
-        <p:cNvGrpSpPr/>
-        <p:nvPr/>
-      </p:nvGrpSpPr>
-      <p:grpSpPr>
-        <a:xfrm>
-          <a:off x="0" y="0"/>
-          <a:ext cx="0" cy="0"/>
-          <a:chOff x="0" y="0"/>
-          <a:chExt cx="0" cy="0"/>
-        </a:xfrm>
-      </p:grpSpPr>
-      <p:sp>
-        <p:nvSpPr>
-          <p:cNvPr id="2" name="Title 1">
-            <a:extLst>
-              <a:ext uri="{FF2B5EF4-FFF2-40B4-BE49-F238E27FC236}">
-                <a16:creationId xmlns:a16="http://schemas.microsoft.com/office/drawing/2014/main" id="{585E897E-9621-4D9C-B88D-05F690D8D600}"/>
-              </a:ext>
-            </a:extLst>
-          </p:cNvPr>
-          <p:cNvSpPr>
-            <a:spLocks noGrp="1"/>
-          </p:cNvSpPr>
-          <p:nvPr>
-            <p:ph type="title"/>
-          </p:nvPr>
-        </p:nvSpPr>
-        <p:spPr/>
-        <p:txBody>
-          <a:bodyPr/>
-          <a:lstStyle/>
-          <a:p>
-            <a:r>
-              <a:rPr lang="en-US" dirty="0"/>
-              <a:t>Techniques to Achieve Zen-like Calm in a Legacy Storm</a:t>
-            </a:r>
-          </a:p>
-        </p:txBody>
-      </p:sp>
-      <p:sp>
-        <p:nvSpPr>
-          <p:cNvPr id="4" name="Text Placeholder 3">
-            <a:extLst>
-              <a:ext uri="{FF2B5EF4-FFF2-40B4-BE49-F238E27FC236}">
-                <a16:creationId xmlns:a16="http://schemas.microsoft.com/office/drawing/2014/main" id="{215DDC1F-0A59-4819-94C0-2D1E8A0E0C34}"/>
-              </a:ext>
-            </a:extLst>
-          </p:cNvPr>
-          <p:cNvSpPr>
-            <a:spLocks noGrp="1"/>
-          </p:cNvSpPr>
-          <p:nvPr>
-            <p:ph type="body" idx="1"/>
-          </p:nvPr>
-        </p:nvSpPr>
-        <p:spPr/>
-        <p:txBody>
-          <a:bodyPr/>
-          <a:lstStyle/>
-          <a:p>
-            <a:endParaRPr lang="en-US"/>
-          </a:p>
-        </p:txBody>
-      </p:sp>
-    </p:spTree>
-    <p:extLst>
-      <p:ext uri="{BB962C8B-B14F-4D97-AF65-F5344CB8AC3E}">
-        <p14:creationId xmlns:p14="http://schemas.microsoft.com/office/powerpoint/2010/main" val="1099608237"/>
-      </p:ext>
-    </p:extLst>
-  </p:cSld>
-  <p:clrMapOvr>
-    <a:masterClrMapping/>
-  </p:clrMapOvr>
-</p:sld>
-</file>
-
-<file path=ppt/slides/slide5.xml><?xml version="1.0" encoding="utf-8"?>
-<p:sld xmlns:a="http://schemas.openxmlformats.org/drawingml/2006/main" xmlns:r="http://schemas.openxmlformats.org/officeDocument/2006/relationships" xmlns:p="http://schemas.openxmlformats.org/presentationml/2006/main">
-  <p:cSld>
-    <p:spTree>
-      <p:nvGrpSpPr>
-        <p:cNvPr id="1" name=""/>
-        <p:cNvGrpSpPr/>
-        <p:nvPr/>
-      </p:nvGrpSpPr>
-      <p:grpSpPr>
-        <a:xfrm>
-          <a:off x="0" y="0"/>
-          <a:ext cx="0" cy="0"/>
-          <a:chOff x="0" y="0"/>
-          <a:chExt cx="0" cy="0"/>
-        </a:xfrm>
-      </p:grpSpPr>
-      <p:sp>
-        <p:nvSpPr>
-          <p:cNvPr id="2" name="Title 1"/>
-          <p:cNvSpPr>
-            <a:spLocks noGrp="1"/>
-          </p:cNvSpPr>
-          <p:nvPr>
-            <p:ph type="title"/>
-          </p:nvPr>
-        </p:nvSpPr>
-        <p:spPr/>
-        <p:txBody>
-          <a:bodyPr/>
-          <a:lstStyle/>
-          <a:p>
-            <a:r>
-              <a:rPr lang="en-US" dirty="0"/>
-              <a:t>Arlo Belshee</a:t>
-            </a:r>
-          </a:p>
-        </p:txBody>
-      </p:sp>
-      <p:sp>
-        <p:nvSpPr>
-          <p:cNvPr id="3" name="Content Placeholder 2"/>
-          <p:cNvSpPr>
-            <a:spLocks noGrp="1"/>
-          </p:cNvSpPr>
-          <p:nvPr>
-            <p:ph sz="quarter" idx="13"/>
-          </p:nvPr>
-        </p:nvSpPr>
-        <p:spPr>
-          <a:xfrm>
-            <a:off x="685330" y="2367093"/>
-            <a:ext cx="7772870" cy="4341438"/>
-          </a:xfrm>
-        </p:spPr>
-        <p:txBody>
-          <a:bodyPr>
-            <a:normAutofit/>
-          </a:bodyPr>
-          <a:lstStyle/>
-          <a:p>
-            <a:pPr marL="0" indent="0">
-              <a:buNone/>
-            </a:pPr>
-            <a:r>
-              <a:rPr lang="en-US" dirty="0">
-                <a:hlinkClick r:id="rId2"/>
-              </a:rPr>
-              <a:t>http://bit.ly/PromiscuousPairingPdf</a:t>
-            </a:r>
-            <a:endParaRPr lang="en-US" dirty="0"/>
-          </a:p>
-          <a:p>
-            <a:pPr marL="0" indent="0">
-              <a:buNone/>
-            </a:pPr>
-            <a:r>
-              <a:rPr lang="en-US" dirty="0">
-                <a:hlinkClick r:id="rId3"/>
-              </a:rPr>
-              <a:t>http://bit.ly/AgileEngineeringFluency</a:t>
-            </a:r>
-            <a:endParaRPr lang="en-US" dirty="0"/>
-          </a:p>
-          <a:p>
-            <a:pPr marL="0" indent="0">
-              <a:buNone/>
-            </a:pPr>
-            <a:r>
-              <a:rPr lang="en-US" dirty="0">
-                <a:hlinkClick r:id="rId4"/>
-              </a:rPr>
-              <a:t>http://bit.ly/NamingIsAProcess</a:t>
-            </a:r>
-            <a:endParaRPr lang="en-US" dirty="0"/>
-          </a:p>
-          <a:p>
-            <a:pPr marL="0" indent="0">
-              <a:buNone/>
-            </a:pPr>
-            <a:r>
-              <a:rPr lang="en-US" dirty="0">
-                <a:hlinkClick r:id="rId5"/>
-              </a:rPr>
-              <a:t>http://bit.ly/BugsZeroSlides</a:t>
-            </a:r>
-            <a:r>
-              <a:rPr lang="en-US" dirty="0"/>
-              <a:t> (this talk)</a:t>
-            </a:r>
-          </a:p>
-          <a:p>
-            <a:pPr marL="0" indent="0">
-              <a:buNone/>
-            </a:pPr>
-            <a:endParaRPr lang="en-US" dirty="0"/>
-          </a:p>
-          <a:p>
-            <a:pPr marL="0" indent="0">
-              <a:buNone/>
-            </a:pPr>
-            <a:r>
-              <a:rPr lang="en-US" dirty="0"/>
-              <a:t>Team Craftsman, Legacy Code Mender, and </a:t>
-            </a:r>
-            <a:r>
-              <a:rPr lang="en-US" dirty="0" err="1"/>
-              <a:t>Rabblerouser</a:t>
-            </a:r>
-            <a:endParaRPr lang="en-US" dirty="0"/>
-          </a:p>
-          <a:p>
-            <a:pPr marL="0" indent="0">
-              <a:buNone/>
-            </a:pPr>
-            <a:r>
-              <a:rPr lang="en-US" dirty="0"/>
-              <a:t>Tableau &amp; Innovating Teams</a:t>
-            </a:r>
-          </a:p>
-          <a:p>
-            <a:pPr marL="0" indent="0">
-              <a:buNone/>
-            </a:pPr>
-            <a:r>
-              <a:rPr lang="en-US" dirty="0"/>
-              <a:t>@</a:t>
-            </a:r>
-            <a:r>
-              <a:rPr lang="en-US" dirty="0" err="1"/>
-              <a:t>arlobelshee</a:t>
-            </a:r>
-            <a:r>
-              <a:rPr lang="en-US" dirty="0"/>
-              <a:t>, </a:t>
-            </a:r>
-            <a:r>
-              <a:rPr lang="en-US" dirty="0" err="1"/>
-              <a:t>github</a:t>
-            </a:r>
-            <a:r>
-              <a:rPr lang="en-US" dirty="0"/>
-              <a:t>/</a:t>
-            </a:r>
-            <a:r>
-              <a:rPr lang="en-US" dirty="0" err="1"/>
-              <a:t>arlobelshee</a:t>
-            </a:r>
-            <a:r>
-              <a:rPr lang="en-US" dirty="0"/>
-              <a:t>, http://arlobelshee.com/</a:t>
-            </a:r>
-          </a:p>
-          <a:p>
-            <a:endParaRPr lang="en-US" dirty="0"/>
-          </a:p>
-          <a:p>
-            <a:endParaRPr lang="en-US" dirty="0"/>
-          </a:p>
-        </p:txBody>
-      </p:sp>
-    </p:spTree>
-    <p:extLst>
-      <p:ext uri="{BB962C8B-B14F-4D97-AF65-F5344CB8AC3E}">
-        <p14:creationId xmlns:p14="http://schemas.microsoft.com/office/powerpoint/2010/main" val="3281816136"/>
-      </p:ext>
-    </p:extLst>
-  </p:cSld>
-  <p:clrMapOvr>
-    <a:masterClrMapping/>
-  </p:clrMapOvr>
-</p:sld>
-</file>
-
-<file path=ppt/slides/slide6.xml><?xml version="1.0" encoding="utf-8"?>
-<p:sld xmlns:a="http://schemas.openxmlformats.org/drawingml/2006/main" xmlns:r="http://schemas.openxmlformats.org/officeDocument/2006/relationships" xmlns:p="http://schemas.openxmlformats.org/presentationml/2006/main">
-  <p:cSld>
-    <p:spTree>
-      <p:nvGrpSpPr>
-        <p:cNvPr id="1" name=""/>
-        <p:cNvGrpSpPr/>
-        <p:nvPr/>
-      </p:nvGrpSpPr>
-      <p:grpSpPr>
-        <a:xfrm>
-          <a:off x="0" y="0"/>
-          <a:ext cx="0" cy="0"/>
-          <a:chOff x="0" y="0"/>
-          <a:chExt cx="0" cy="0"/>
-        </a:xfrm>
-      </p:grpSpPr>
-      <p:sp>
-        <p:nvSpPr>
-          <p:cNvPr id="2" name="Title 1">
-            <a:extLst>
-              <a:ext uri="{FF2B5EF4-FFF2-40B4-BE49-F238E27FC236}">
-                <a16:creationId xmlns:a16="http://schemas.microsoft.com/office/drawing/2014/main" id="{D731C687-1599-445E-9795-6CAE26FA2AFD}"/>
-              </a:ext>
-            </a:extLst>
-          </p:cNvPr>
-          <p:cNvSpPr>
-            <a:spLocks noGrp="1"/>
-          </p:cNvSpPr>
-          <p:nvPr>
-            <p:ph type="title"/>
-          </p:nvPr>
-        </p:nvSpPr>
-        <p:spPr/>
-        <p:txBody>
-          <a:bodyPr/>
-          <a:lstStyle/>
-          <a:p>
-            <a:r>
-              <a:rPr lang="en-US" dirty="0"/>
-              <a:t>Insight Loop</a:t>
-            </a:r>
-          </a:p>
-        </p:txBody>
-      </p:sp>
-      <p:graphicFrame>
-        <p:nvGraphicFramePr>
-          <p:cNvPr id="4" name="Content Placeholder 3">
-            <a:extLst>
-              <a:ext uri="{FF2B5EF4-FFF2-40B4-BE49-F238E27FC236}">
-                <a16:creationId xmlns:a16="http://schemas.microsoft.com/office/drawing/2014/main" id="{1C9663ED-BCCB-4B86-B47D-DEB7EFE44EB2}"/>
-              </a:ext>
-            </a:extLst>
-          </p:cNvPr>
-          <p:cNvGraphicFramePr>
-            <a:graphicFrameLocks noGrp="1"/>
-          </p:cNvGraphicFramePr>
-          <p:nvPr>
-            <p:ph sz="quarter" idx="13"/>
-            <p:extLst>
-              <p:ext uri="{D42A27DB-BD31-4B8C-83A1-F6EECF244321}">
-                <p14:modId xmlns:p14="http://schemas.microsoft.com/office/powerpoint/2010/main" val="3772936454"/>
-              </p:ext>
-            </p:extLst>
-          </p:nvPr>
-        </p:nvGraphicFramePr>
-        <p:xfrm>
-          <a:off x="0" y="2022232"/>
-          <a:ext cx="9144000" cy="4448906"/>
-        </p:xfrm>
-        <a:graphic>
-          <a:graphicData uri="http://schemas.openxmlformats.org/drawingml/2006/diagram">
-            <dgm:relIds xmlns:dgm="http://schemas.openxmlformats.org/drawingml/2006/diagram" xmlns:r="http://schemas.openxmlformats.org/officeDocument/2006/relationships" r:dm="rId2" r:lo="rId3" r:qs="rId4" r:cs="rId5"/>
-          </a:graphicData>
-        </a:graphic>
-      </p:graphicFrame>
-    </p:spTree>
-    <p:extLst>
-      <p:ext uri="{BB962C8B-B14F-4D97-AF65-F5344CB8AC3E}">
-        <p14:creationId xmlns:p14="http://schemas.microsoft.com/office/powerpoint/2010/main" val="490106897"/>
-      </p:ext>
-    </p:extLst>
-  </p:cSld>
-  <p:clrMapOvr>
-    <a:masterClrMapping/>
-  </p:clrMapOvr>
-</p:sld>
-</file>
-
-<file path=ppt/slides/slide7.xml><?xml version="1.0" encoding="utf-8"?>
-<p:sld xmlns:a="http://schemas.openxmlformats.org/drawingml/2006/main" xmlns:r="http://schemas.openxmlformats.org/officeDocument/2006/relationships" xmlns:p="http://schemas.openxmlformats.org/presentationml/2006/main">
-  <p:cSld>
-    <p:spTree>
-      <p:nvGrpSpPr>
-        <p:cNvPr id="1" name=""/>
-        <p:cNvGrpSpPr/>
-        <p:nvPr/>
-      </p:nvGrpSpPr>
-      <p:grpSpPr>
-        <a:xfrm>
-          <a:off x="0" y="0"/>
-          <a:ext cx="0" cy="0"/>
-          <a:chOff x="0" y="0"/>
-          <a:chExt cx="0" cy="0"/>
-        </a:xfrm>
-      </p:grpSpPr>
-      <p:sp>
-        <p:nvSpPr>
-          <p:cNvPr id="2" name="Title 1">
-            <a:extLst>
-              <a:ext uri="{FF2B5EF4-FFF2-40B4-BE49-F238E27FC236}">
-                <a16:creationId xmlns:a16="http://schemas.microsoft.com/office/drawing/2014/main" id="{D639881A-189A-4824-9318-668F9E2A9B1A}"/>
-              </a:ext>
-            </a:extLst>
-          </p:cNvPr>
-          <p:cNvSpPr>
-            <a:spLocks noGrp="1"/>
-          </p:cNvSpPr>
-          <p:nvPr>
-            <p:ph type="title"/>
-          </p:nvPr>
-        </p:nvSpPr>
-        <p:spPr/>
-        <p:txBody>
-          <a:bodyPr/>
-          <a:lstStyle/>
-          <a:p>
-            <a:r>
-              <a:rPr lang="en-US" dirty="0"/>
-              <a:t>TDD Gets the Press;</a:t>
-            </a:r>
-            <a:br>
-              <a:rPr lang="en-US" dirty="0"/>
-            </a:br>
-            <a:r>
-              <a:rPr lang="en-US" dirty="0"/>
-              <a:t>Refactoring Gets the Results</a:t>
-            </a:r>
-          </a:p>
-        </p:txBody>
-      </p:sp>
-      <p:sp>
-        <p:nvSpPr>
-          <p:cNvPr id="3" name="Content Placeholder 2">
-            <a:extLst>
-              <a:ext uri="{FF2B5EF4-FFF2-40B4-BE49-F238E27FC236}">
-                <a16:creationId xmlns:a16="http://schemas.microsoft.com/office/drawing/2014/main" id="{C94B4304-96EB-402D-B301-6419BDE30B51}"/>
-              </a:ext>
-            </a:extLst>
-          </p:cNvPr>
-          <p:cNvSpPr>
-            <a:spLocks noGrp="1"/>
-          </p:cNvSpPr>
-          <p:nvPr>
-            <p:ph sz="quarter" idx="4294967295"/>
-          </p:nvPr>
-        </p:nvSpPr>
-        <p:spPr>
-          <a:xfrm>
-            <a:off x="0" y="2366963"/>
-            <a:ext cx="7772400" cy="3424237"/>
-          </a:xfrm>
-        </p:spPr>
-        <p:txBody>
-          <a:bodyPr/>
-          <a:lstStyle/>
-          <a:p>
-            <a:r>
-              <a:rPr lang="en-US" dirty="0"/>
-              <a:t>And it’s not that simple…</a:t>
-            </a:r>
-          </a:p>
-        </p:txBody>
-      </p:sp>
-    </p:spTree>
-    <p:extLst>
-      <p:ext uri="{BB962C8B-B14F-4D97-AF65-F5344CB8AC3E}">
-        <p14:creationId xmlns:p14="http://schemas.microsoft.com/office/powerpoint/2010/main" val="2838673724"/>
-      </p:ext>
-    </p:extLst>
-  </p:cSld>
-  <p:clrMapOvr>
-    <a:masterClrMapping/>
-  </p:clrMapOvr>
-</p:sld>
-</file>
-
-<file path=ppt/slides/slide8.xml><?xml version="1.0" encoding="utf-8"?>
-<p:sld xmlns:a="http://schemas.openxmlformats.org/drawingml/2006/main" xmlns:r="http://schemas.openxmlformats.org/officeDocument/2006/relationships" xmlns:p="http://schemas.openxmlformats.org/presentationml/2006/main">
-  <p:cSld>
-    <p:spTree>
-      <p:nvGrpSpPr>
-        <p:cNvPr id="1" name=""/>
-        <p:cNvGrpSpPr/>
-        <p:nvPr/>
-      </p:nvGrpSpPr>
-      <p:grpSpPr>
-        <a:xfrm>
-          <a:off x="0" y="0"/>
-          <a:ext cx="0" cy="0"/>
-          <a:chOff x="0" y="0"/>
-          <a:chExt cx="0" cy="0"/>
-        </a:xfrm>
-      </p:grpSpPr>
-      <p:sp>
-        <p:nvSpPr>
-          <p:cNvPr id="2" name="Title 1">
-            <a:extLst>
-              <a:ext uri="{FF2B5EF4-FFF2-40B4-BE49-F238E27FC236}">
-                <a16:creationId xmlns:a16="http://schemas.microsoft.com/office/drawing/2014/main" id="{3E7E12B6-3CAA-4C97-8BDF-5CEE0A0E71C3}"/>
-              </a:ext>
-            </a:extLst>
-          </p:cNvPr>
-          <p:cNvSpPr>
-            <a:spLocks noGrp="1"/>
-          </p:cNvSpPr>
-          <p:nvPr>
-            <p:ph type="title"/>
-          </p:nvPr>
-        </p:nvSpPr>
-        <p:spPr/>
-        <p:txBody>
-          <a:bodyPr>
-            <a:normAutofit fontScale="90000"/>
-          </a:bodyPr>
-          <a:lstStyle/>
-          <a:p>
-            <a:r>
-              <a:rPr lang="en-US" dirty="0"/>
-              <a:t>Refactoring Legacy is Easy;</a:t>
-            </a:r>
-            <a:br>
-              <a:rPr lang="en-US" dirty="0"/>
-            </a:br>
-            <a:r>
-              <a:rPr lang="en-US" dirty="0"/>
-              <a:t>Refactoring Greenfield is Hard</a:t>
-            </a:r>
-          </a:p>
-        </p:txBody>
-      </p:sp>
-    </p:spTree>
-    <p:extLst>
-      <p:ext uri="{BB962C8B-B14F-4D97-AF65-F5344CB8AC3E}">
-        <p14:creationId xmlns:p14="http://schemas.microsoft.com/office/powerpoint/2010/main" val="2172297416"/>
-      </p:ext>
-    </p:extLst>
-  </p:cSld>
-  <p:clrMapOvr>
-    <a:masterClrMapping/>
-  </p:clrMapOvr>
-</p:sld>
-</file>
-
-<file path=ppt/slides/slide9.xml><?xml version="1.0" encoding="utf-8"?>
-<p:sld xmlns:a="http://schemas.openxmlformats.org/drawingml/2006/main" xmlns:r="http://schemas.openxmlformats.org/officeDocument/2006/relationships" xmlns:p="http://schemas.openxmlformats.org/presentationml/2006/main">
-  <p:cSld>
-    <p:spTree>
-      <p:nvGrpSpPr>
-        <p:cNvPr id="1" name=""/>
-        <p:cNvGrpSpPr/>
-        <p:nvPr/>
-      </p:nvGrpSpPr>
-      <p:grpSpPr>
-        <a:xfrm>
-          <a:off x="0" y="0"/>
-          <a:ext cx="0" cy="0"/>
-          <a:chOff x="0" y="0"/>
-          <a:chExt cx="0" cy="0"/>
-        </a:xfrm>
-      </p:grpSpPr>
-      <p:sp>
-        <p:nvSpPr>
-          <p:cNvPr id="2" name="Title 1">
-            <a:extLst>
-              <a:ext uri="{FF2B5EF4-FFF2-40B4-BE49-F238E27FC236}">
-                <a16:creationId xmlns:a16="http://schemas.microsoft.com/office/drawing/2014/main" id="{01455375-DFD8-4C0B-BED6-BE443F641A71}"/>
-              </a:ext>
-            </a:extLst>
-          </p:cNvPr>
-          <p:cNvSpPr>
-            <a:spLocks noGrp="1"/>
-          </p:cNvSpPr>
-          <p:nvPr>
-            <p:ph type="title"/>
-          </p:nvPr>
-        </p:nvSpPr>
-        <p:spPr>
-          <a:xfrm>
-            <a:off x="685331" y="316523"/>
-            <a:ext cx="7763814" cy="6224954"/>
-          </a:xfrm>
-        </p:spPr>
-        <p:txBody>
-          <a:bodyPr/>
-          <a:lstStyle/>
-          <a:p>
-            <a:r>
-              <a:rPr lang="en-US" dirty="0"/>
-              <a:t>Design by Listening;</a:t>
-            </a:r>
-            <a:br>
-              <a:rPr lang="en-US" dirty="0"/>
-            </a:br>
-            <a:r>
-              <a:rPr lang="en-US" dirty="0"/>
-              <a:t>Big Changes Come From Small Changes</a:t>
-            </a:r>
-          </a:p>
-        </p:txBody>
-      </p:sp>
-    </p:spTree>
-    <p:extLst>
-      <p:ext uri="{BB962C8B-B14F-4D97-AF65-F5344CB8AC3E}">
-        <p14:creationId xmlns:p14="http://schemas.microsoft.com/office/powerpoint/2010/main" val="4198070965"/>
       </p:ext>
     </p:extLst>
   </p:cSld>

</xml_diff>